<commit_message>
Added 'HEAD TRACKING' info in PPT
</commit_message>
<xml_diff>
--- a/docs/KINECT_AR_2.pptx
+++ b/docs/KINECT_AR_2.pptx
@@ -15,7 +15,13 @@
     <p:sldId id="261" r:id="rId9"/>
     <p:sldId id="262" r:id="rId10"/>
     <p:sldId id="266" r:id="rId11"/>
-    <p:sldId id="265" r:id="rId12"/>
+    <p:sldId id="271" r:id="rId12"/>
+    <p:sldId id="272" r:id="rId13"/>
+    <p:sldId id="273" r:id="rId14"/>
+    <p:sldId id="274" r:id="rId15"/>
+    <p:sldId id="275" r:id="rId16"/>
+    <p:sldId id="276" r:id="rId17"/>
+    <p:sldId id="265" r:id="rId18"/>
   </p:sldIdLst>
   <p:sldSz cx="9144000" cy="6858000" type="screen4x3"/>
   <p:notesSz cx="6858000" cy="9144000"/>
@@ -3095,7 +3101,6 @@
               <a:rPr lang="en-GB" sz="4000" b="1" dirty="0" smtClean="0"/>
               <a:t>KINECT AR</a:t>
             </a:r>
-            <a:endParaRPr lang="en-GB" sz="4000" b="1" dirty="0" smtClean="0"/>
           </a:p>
           <a:p>
             <a:r>
@@ -3107,18 +3112,7 @@
                   </a:schemeClr>
                 </a:solidFill>
               </a:rPr>
-              <a:t>TECHNICAL </a:t>
-            </a:r>
-            <a:r>
-              <a:rPr lang="en-GB" sz="4000" b="1" dirty="0" smtClean="0">
-                <a:solidFill>
-                  <a:schemeClr val="tx1">
-                    <a:lumMod val="50000"/>
-                    <a:lumOff val="50000"/>
-                  </a:schemeClr>
-                </a:solidFill>
-              </a:rPr>
-              <a:t>COMPONENTS - BIS</a:t>
+              <a:t>TECHNICAL COMPONENTS - BIS</a:t>
             </a:r>
             <a:endParaRPr lang="en-GB" sz="4000" b="1" dirty="0">
               <a:solidFill>
@@ -3189,17 +3183,12 @@
               <a:rPr lang="en-GB" b="1" u="sng" dirty="0" smtClean="0"/>
               <a:t>Orientation:</a:t>
             </a:r>
-            <a:endParaRPr lang="en-GB" b="1" u="sng" dirty="0" smtClean="0"/>
           </a:p>
           <a:p>
             <a:pPr lvl="1"/>
             <a:r>
               <a:rPr lang="en-GB" dirty="0" smtClean="0"/>
-              <a:t>=&gt; </a:t>
-            </a:r>
-            <a:r>
-              <a:rPr lang="en-GB" dirty="0" smtClean="0"/>
-              <a:t>... (TODO: explain </a:t>
+              <a:t>=&gt; ... (TODO: explain </a:t>
             </a:r>
             <a:r>
               <a:rPr lang="en-GB" dirty="0" err="1" smtClean="0"/>
@@ -3209,7 +3198,6 @@
               <a:rPr lang="en-GB" dirty="0" smtClean="0"/>
               <a:t> image analysis method ...</a:t>
             </a:r>
-            <a:endParaRPr lang="en-GB" dirty="0" smtClean="0"/>
           </a:p>
           <a:p>
             <a:pPr lvl="1"/>
@@ -3372,11 +3360,6 @@
               </a:rPr>
               <a:t>!!!! TODO !!!!</a:t>
             </a:r>
-            <a:endParaRPr lang="en-GB" sz="2400" b="1" dirty="0" smtClean="0">
-              <a:solidFill>
-                <a:srgbClr val="FF0000"/>
-              </a:solidFill>
-            </a:endParaRPr>
           </a:p>
         </p:txBody>
       </p:sp>
@@ -3421,7 +3404,7 @@
         <p:spPr>
           <a:xfrm>
             <a:off x="899592" y="1052736"/>
-            <a:ext cx="6590587" cy="2308324"/>
+            <a:ext cx="8498417" cy="3693319"/>
           </a:xfrm>
           <a:prstGeom prst="rect">
             <a:avLst/>
@@ -3435,29 +3418,17 @@
           <a:lstStyle/>
           <a:p>
             <a:r>
+              <a:rPr lang="en-GB" b="1" u="sng" dirty="0" smtClean="0"/>
+              <a:t>HEAD TRACKING:</a:t>
+            </a:r>
+          </a:p>
+          <a:p>
+            <a:endParaRPr lang="en-GB" dirty="0" smtClean="0"/>
+          </a:p>
+          <a:p>
+            <a:r>
               <a:rPr lang="en-GB" dirty="0" smtClean="0"/>
-              <a:t>...</a:t>
-            </a:r>
-            <a:endParaRPr lang="en-GB" smtClean="0"/>
-          </a:p>
-          <a:p>
-            <a:endParaRPr lang="en-GB" dirty="0" smtClean="0"/>
-          </a:p>
-          <a:p>
-            <a:pPr>
-              <a:buFontTx/>
-              <a:buChar char="-"/>
-            </a:pPr>
-            <a:r>
-              <a:rPr lang="en-GB" dirty="0" smtClean="0"/>
-              <a:t> Hand tracking</a:t>
-            </a:r>
-          </a:p>
-          <a:p>
-            <a:pPr lvl="1"/>
-            <a:r>
-              <a:rPr lang="en-GB" dirty="0" smtClean="0"/>
-              <a:t>=&gt; Using </a:t>
+              <a:t>- Tracking using the </a:t>
             </a:r>
             <a:r>
               <a:rPr lang="en-GB" dirty="0" err="1" smtClean="0"/>
@@ -3465,50 +3436,64 @@
             </a:r>
             <a:r>
               <a:rPr lang="en-GB" dirty="0" smtClean="0"/>
-              <a:t> body frames</a:t>
-            </a:r>
-          </a:p>
-          <a:p>
-            <a:pPr lvl="1"/>
+              <a:t>:</a:t>
+            </a:r>
+          </a:p>
+          <a:p>
             <a:r>
               <a:rPr lang="en-GB" dirty="0" smtClean="0"/>
-              <a:t>! – Tracking struggle when hands in front of body!</a:t>
+              <a:t>  =&gt; Colour tracking in area around the head (area size related to distance from camera)</a:t>
             </a:r>
           </a:p>
           <a:p>
             <a:endParaRPr lang="en-GB" dirty="0" smtClean="0"/>
           </a:p>
           <a:p>
-            <a:pPr>
-              <a:buFontTx/>
-              <a:buChar char="-"/>
-            </a:pPr>
             <a:r>
               <a:rPr lang="en-GB" dirty="0" smtClean="0"/>
-              <a:t> Could hold coloured devices to allow different types of interactions</a:t>
-            </a:r>
-          </a:p>
-          <a:p>
-            <a:pPr lvl="1"/>
+              <a:t>  Process:</a:t>
+            </a:r>
+          </a:p>
+          <a:p>
             <a:r>
               <a:rPr lang="en-GB" dirty="0" smtClean="0"/>
-              <a:t>=&gt; Colour tracking with </a:t>
-            </a:r>
-            <a:r>
-              <a:rPr lang="en-GB" dirty="0" err="1" smtClean="0"/>
-              <a:t>Kinect</a:t>
-            </a:r>
+              <a:t>    1 - Colour Segmentation - Blobs Detection</a:t>
+            </a:r>
+          </a:p>
+          <a:p>
             <a:r>
               <a:rPr lang="en-GB" dirty="0" smtClean="0"/>
-              <a:t> RGB image (using </a:t>
-            </a:r>
-            <a:r>
-              <a:rPr lang="en-GB" dirty="0" err="1" smtClean="0"/>
-              <a:t>OpenCV</a:t>
-            </a:r>
+              <a:t>      =&gt; Biggest clusters of specific colours in RGB image.</a:t>
+            </a:r>
+          </a:p>
+          <a:p>
             <a:r>
               <a:rPr lang="en-GB" dirty="0" smtClean="0"/>
-              <a:t>?)</a:t>
+              <a:t>    2 - Positions Determination</a:t>
+            </a:r>
+          </a:p>
+          <a:p>
+            <a:r>
+              <a:rPr lang="en-GB" dirty="0" smtClean="0"/>
+              <a:t>      =&gt; From values in depth image at corresponding positions.</a:t>
+            </a:r>
+          </a:p>
+          <a:p>
+            <a:r>
+              <a:rPr lang="en-GB" dirty="0" smtClean="0"/>
+              <a:t>    3 - Pose Estimation</a:t>
+            </a:r>
+          </a:p>
+          <a:p>
+            <a:r>
+              <a:rPr lang="en-GB" dirty="0" smtClean="0"/>
+              <a:t>      =&gt; Determine transformation from original model to found model.</a:t>
+            </a:r>
+          </a:p>
+          <a:p>
+            <a:r>
+              <a:rPr lang="en-GB" dirty="0" smtClean="0"/>
+              <a:t>      (Only orientation is required, no position)</a:t>
             </a:r>
           </a:p>
         </p:txBody>
@@ -3522,7 +3507,7 @@
         <p:spPr>
           <a:xfrm>
             <a:off x="323528" y="260648"/>
-            <a:ext cx="2278188" cy="461665"/>
+            <a:ext cx="2077235" cy="461665"/>
           </a:xfrm>
           <a:prstGeom prst="rect">
             <a:avLst/>
@@ -3537,14 +3522,14 @@
           <a:p>
             <a:r>
               <a:rPr lang="en-GB" sz="2400" b="1" dirty="0" smtClean="0"/>
-              <a:t>CLIENT – HANDS</a:t>
-            </a:r>
-          </a:p>
-        </p:txBody>
-      </p:sp>
-      <p:sp>
-        <p:nvSpPr>
-          <p:cNvPr id="4" name="ZoneTexte 3"/>
+              <a:t>CLIENT – HEAD</a:t>
+            </a:r>
+          </a:p>
+        </p:txBody>
+      </p:sp>
+      <p:sp>
+        <p:nvSpPr>
+          <p:cNvPr id="13" name="ZoneTexte 12"/>
           <p:cNvSpPr txBox="1"/>
           <p:nvPr/>
         </p:nvSpPr>
@@ -3572,11 +3557,1858 @@
               </a:rPr>
               <a:t>!!!! TODO !!!!</a:t>
             </a:r>
-            <a:endParaRPr lang="en-GB" sz="2400" b="1" dirty="0" smtClean="0">
-              <a:solidFill>
-                <a:srgbClr val="FF0000"/>
-              </a:solidFill>
-            </a:endParaRPr>
+          </a:p>
+        </p:txBody>
+      </p:sp>
+    </p:spTree>
+  </p:cSld>
+  <p:clrMapOvr>
+    <a:masterClrMapping/>
+  </p:clrMapOvr>
+  <p:timing>
+    <p:tnLst>
+      <p:par>
+        <p:cTn id="1" dur="indefinite" restart="never" nodeType="tmRoot"/>
+      </p:par>
+    </p:tnLst>
+  </p:timing>
+</p:sld>
+</file>
+
+<file path=ppt/slides/slide12.xml><?xml version="1.0" encoding="utf-8"?>
+<p:sld xmlns:a="http://schemas.openxmlformats.org/drawingml/2006/main" xmlns:r="http://schemas.openxmlformats.org/officeDocument/2006/relationships" xmlns:p="http://schemas.openxmlformats.org/presentationml/2006/main">
+  <p:cSld>
+    <p:spTree>
+      <p:nvGrpSpPr>
+        <p:cNvPr id="1" name=""/>
+        <p:cNvGrpSpPr/>
+        <p:nvPr/>
+      </p:nvGrpSpPr>
+      <p:grpSpPr>
+        <a:xfrm>
+          <a:off x="0" y="0"/>
+          <a:ext cx="0" cy="0"/>
+          <a:chOff x="0" y="0"/>
+          <a:chExt cx="0" cy="0"/>
+        </a:xfrm>
+      </p:grpSpPr>
+      <p:sp>
+        <p:nvSpPr>
+          <p:cNvPr id="17" name="ZoneTexte 16"/>
+          <p:cNvSpPr txBox="1"/>
+          <p:nvPr/>
+        </p:nvSpPr>
+        <p:spPr>
+          <a:xfrm>
+            <a:off x="899592" y="1052736"/>
+            <a:ext cx="6824689" cy="4247317"/>
+          </a:xfrm>
+          <a:prstGeom prst="rect">
+            <a:avLst/>
+          </a:prstGeom>
+          <a:noFill/>
+        </p:spPr>
+        <p:txBody>
+          <a:bodyPr wrap="none" rtlCol="0">
+            <a:spAutoFit/>
+          </a:bodyPr>
+          <a:lstStyle/>
+          <a:p>
+            <a:r>
+              <a:rPr lang="en-GB" b="1" u="sng" dirty="0" smtClean="0"/>
+              <a:t>HEAD TRACKING:</a:t>
+            </a:r>
+          </a:p>
+          <a:p>
+            <a:endParaRPr lang="en-GB" dirty="0" smtClean="0"/>
+          </a:p>
+          <a:p>
+            <a:r>
+              <a:rPr lang="en-GB" dirty="0" smtClean="0"/>
+              <a:t>Requirements</a:t>
+            </a:r>
+            <a:r>
+              <a:rPr lang="en-GB" dirty="0" smtClean="0"/>
+              <a:t>:</a:t>
+            </a:r>
+          </a:p>
+          <a:p>
+            <a:endParaRPr lang="en-GB" dirty="0" smtClean="0"/>
+          </a:p>
+          <a:p>
+            <a:r>
+              <a:rPr lang="en-GB" dirty="0" smtClean="0"/>
+              <a:t>  - Hardware:</a:t>
+            </a:r>
+          </a:p>
+          <a:p>
+            <a:r>
+              <a:rPr lang="en-GB" dirty="0" smtClean="0"/>
+              <a:t>    - Minimum 4 (3?) markers to determine the rotation matrix</a:t>
+            </a:r>
+          </a:p>
+          <a:p>
+            <a:r>
+              <a:rPr lang="en-GB" dirty="0" smtClean="0"/>
+              <a:t>    - Markers need to be unique and easily </a:t>
+            </a:r>
+            <a:r>
+              <a:rPr lang="en-GB" dirty="0" err="1" smtClean="0"/>
+              <a:t>trackable</a:t>
+            </a:r>
+            <a:endParaRPr lang="en-GB" dirty="0" smtClean="0"/>
+          </a:p>
+          <a:p>
+            <a:r>
+              <a:rPr lang="en-GB" dirty="0" smtClean="0"/>
+              <a:t>      =&gt; Bright/luminescent colours.</a:t>
+            </a:r>
+          </a:p>
+          <a:p>
+            <a:r>
+              <a:rPr lang="en-GB" dirty="0" smtClean="0"/>
+              <a:t>    - Markers physical layout must be deterministic</a:t>
+            </a:r>
+          </a:p>
+          <a:p>
+            <a:r>
+              <a:rPr lang="en-GB" dirty="0" smtClean="0"/>
+              <a:t>      =&gt; Combined ears and "</a:t>
+            </a:r>
+            <a:r>
+              <a:rPr lang="en-GB" dirty="0" err="1" smtClean="0"/>
+              <a:t>mohawk</a:t>
+            </a:r>
+            <a:r>
+              <a:rPr lang="en-GB" dirty="0" smtClean="0"/>
+              <a:t>"?</a:t>
+            </a:r>
+          </a:p>
+          <a:p>
+            <a:r>
+              <a:rPr lang="en-GB" dirty="0" smtClean="0"/>
+              <a:t>        (Could use flashy 80s </a:t>
+            </a:r>
+            <a:r>
+              <a:rPr lang="en-GB" dirty="0" err="1" smtClean="0"/>
+              <a:t>earpuffs</a:t>
+            </a:r>
+            <a:r>
+              <a:rPr lang="en-GB" dirty="0" smtClean="0"/>
+              <a:t>)</a:t>
+            </a:r>
+          </a:p>
+          <a:p>
+            <a:r>
+              <a:rPr lang="en-GB" dirty="0" smtClean="0"/>
+              <a:t>    - Players need to wear a special headset holding markers</a:t>
+            </a:r>
+          </a:p>
+          <a:p>
+            <a:r>
+              <a:rPr lang="en-GB" dirty="0" smtClean="0"/>
+              <a:t>    - Players can't get out of </a:t>
+            </a:r>
+            <a:r>
+              <a:rPr lang="en-GB" dirty="0" err="1" smtClean="0"/>
+              <a:t>Kinect</a:t>
+            </a:r>
+            <a:r>
+              <a:rPr lang="en-GB" dirty="0" smtClean="0"/>
+              <a:t> </a:t>
+            </a:r>
+            <a:r>
+              <a:rPr lang="en-GB" dirty="0" smtClean="0"/>
+              <a:t>FOV</a:t>
+            </a:r>
+          </a:p>
+          <a:p>
+            <a:r>
+              <a:rPr lang="en-GB" dirty="0" smtClean="0"/>
+              <a:t>	</a:t>
+            </a:r>
+            <a:r>
+              <a:rPr lang="en-GB" dirty="0" smtClean="0"/>
+              <a:t>(shouldn't </a:t>
+            </a:r>
+            <a:r>
+              <a:rPr lang="en-GB" dirty="0" smtClean="0"/>
+              <a:t>anyway, as positioning will not work either)</a:t>
+            </a:r>
+          </a:p>
+          <a:p>
+            <a:r>
+              <a:rPr lang="en-GB" dirty="0" smtClean="0"/>
+              <a:t>      =&gt; If losing tracking, use the device's gyroscope? (How to manage?)</a:t>
+            </a:r>
+          </a:p>
+        </p:txBody>
+      </p:sp>
+      <p:sp>
+        <p:nvSpPr>
+          <p:cNvPr id="18" name="ZoneTexte 17"/>
+          <p:cNvSpPr txBox="1"/>
+          <p:nvPr/>
+        </p:nvSpPr>
+        <p:spPr>
+          <a:xfrm>
+            <a:off x="323528" y="260648"/>
+            <a:ext cx="2077235" cy="461665"/>
+          </a:xfrm>
+          <a:prstGeom prst="rect">
+            <a:avLst/>
+          </a:prstGeom>
+          <a:noFill/>
+        </p:spPr>
+        <p:txBody>
+          <a:bodyPr wrap="none" rtlCol="0">
+            <a:spAutoFit/>
+          </a:bodyPr>
+          <a:lstStyle/>
+          <a:p>
+            <a:r>
+              <a:rPr lang="en-GB" sz="2400" b="1" dirty="0" smtClean="0"/>
+              <a:t>CLIENT – HEAD</a:t>
+            </a:r>
+          </a:p>
+        </p:txBody>
+      </p:sp>
+      <p:sp>
+        <p:nvSpPr>
+          <p:cNvPr id="13" name="ZoneTexte 12"/>
+          <p:cNvSpPr txBox="1"/>
+          <p:nvPr/>
+        </p:nvSpPr>
+        <p:spPr>
+          <a:xfrm>
+            <a:off x="3491880" y="404664"/>
+            <a:ext cx="1885196" cy="461665"/>
+          </a:xfrm>
+          <a:prstGeom prst="rect">
+            <a:avLst/>
+          </a:prstGeom>
+          <a:noFill/>
+        </p:spPr>
+        <p:txBody>
+          <a:bodyPr wrap="none" rtlCol="0">
+            <a:spAutoFit/>
+          </a:bodyPr>
+          <a:lstStyle/>
+          <a:p>
+            <a:r>
+              <a:rPr lang="en-GB" sz="2400" b="1" dirty="0" smtClean="0">
+                <a:solidFill>
+                  <a:srgbClr val="FF0000"/>
+                </a:solidFill>
+              </a:rPr>
+              <a:t>!!!! TODO !!!!</a:t>
+            </a:r>
+          </a:p>
+        </p:txBody>
+      </p:sp>
+    </p:spTree>
+  </p:cSld>
+  <p:clrMapOvr>
+    <a:masterClrMapping/>
+  </p:clrMapOvr>
+  <p:timing>
+    <p:tnLst>
+      <p:par>
+        <p:cTn id="1" dur="indefinite" restart="never" nodeType="tmRoot"/>
+      </p:par>
+    </p:tnLst>
+  </p:timing>
+</p:sld>
+</file>
+
+<file path=ppt/slides/slide13.xml><?xml version="1.0" encoding="utf-8"?>
+<p:sld xmlns:a="http://schemas.openxmlformats.org/drawingml/2006/main" xmlns:r="http://schemas.openxmlformats.org/officeDocument/2006/relationships" xmlns:p="http://schemas.openxmlformats.org/presentationml/2006/main">
+  <p:cSld>
+    <p:spTree>
+      <p:nvGrpSpPr>
+        <p:cNvPr id="1" name=""/>
+        <p:cNvGrpSpPr/>
+        <p:nvPr/>
+      </p:nvGrpSpPr>
+      <p:grpSpPr>
+        <a:xfrm>
+          <a:off x="0" y="0"/>
+          <a:ext cx="0" cy="0"/>
+          <a:chOff x="0" y="0"/>
+          <a:chExt cx="0" cy="0"/>
+        </a:xfrm>
+      </p:grpSpPr>
+      <p:sp>
+        <p:nvSpPr>
+          <p:cNvPr id="17" name="ZoneTexte 16"/>
+          <p:cNvSpPr txBox="1"/>
+          <p:nvPr/>
+        </p:nvSpPr>
+        <p:spPr>
+          <a:xfrm>
+            <a:off x="899592" y="1052736"/>
+            <a:ext cx="6836102" cy="5324535"/>
+          </a:xfrm>
+          <a:prstGeom prst="rect">
+            <a:avLst/>
+          </a:prstGeom>
+          <a:noFill/>
+        </p:spPr>
+        <p:txBody>
+          <a:bodyPr wrap="none" rtlCol="0">
+            <a:spAutoFit/>
+          </a:bodyPr>
+          <a:lstStyle/>
+          <a:p>
+            <a:r>
+              <a:rPr lang="en-GB" b="1" u="sng" dirty="0" smtClean="0"/>
+              <a:t>HEAD TRACKING:</a:t>
+            </a:r>
+          </a:p>
+          <a:p>
+            <a:r>
+              <a:rPr lang="en-GB" sz="1400" dirty="0" smtClean="0"/>
+              <a:t>LOOK AT:</a:t>
+            </a:r>
+            <a:endParaRPr lang="en-GB" sz="1400" dirty="0" smtClean="0"/>
+          </a:p>
+          <a:p>
+            <a:r>
+              <a:rPr lang="en-GB" sz="1400" dirty="0" smtClean="0"/>
+              <a:t>- Software:</a:t>
+            </a:r>
+          </a:p>
+          <a:p>
+            <a:r>
+              <a:rPr lang="en-GB" sz="1400" dirty="0" smtClean="0"/>
+              <a:t>    !? =&gt; LOOK AT:</a:t>
+            </a:r>
+          </a:p>
+          <a:p>
+            <a:r>
+              <a:rPr lang="en-GB" sz="1400" dirty="0" smtClean="0"/>
+              <a:t>      - AForge.NET (in C#):</a:t>
+            </a:r>
+          </a:p>
+          <a:p>
+            <a:r>
+              <a:rPr lang="en-GB" sz="1400" dirty="0" smtClean="0"/>
+              <a:t>        http://www.aforgenet.com/</a:t>
+            </a:r>
+          </a:p>
+          <a:p>
+            <a:r>
+              <a:rPr lang="en-GB" sz="1400" dirty="0" smtClean="0"/>
+              <a:t>        https://www.codeproject.com/Questions/738734/blob-detection-in-csharp</a:t>
+            </a:r>
+          </a:p>
+          <a:p>
+            <a:r>
+              <a:rPr lang="en-GB" sz="1400" dirty="0" smtClean="0"/>
+              <a:t>        http://www.emgu.com/forum/viewtopic.php?t=477</a:t>
+            </a:r>
+          </a:p>
+          <a:p>
+            <a:endParaRPr lang="en-GB" sz="1400" dirty="0" smtClean="0"/>
+          </a:p>
+          <a:p>
+            <a:r>
+              <a:rPr lang="en-GB" sz="1400" dirty="0" smtClean="0"/>
+              <a:t>    =&gt; Search for:</a:t>
+            </a:r>
+          </a:p>
+          <a:p>
+            <a:r>
+              <a:rPr lang="en-GB" sz="1400" dirty="0" smtClean="0"/>
+              <a:t>    - </a:t>
+            </a:r>
+            <a:r>
+              <a:rPr lang="en-GB" sz="1400" dirty="0" err="1" smtClean="0"/>
+              <a:t>OpenCV</a:t>
+            </a:r>
+            <a:r>
+              <a:rPr lang="en-GB" sz="1400" dirty="0" smtClean="0"/>
+              <a:t> for Unity</a:t>
+            </a:r>
+          </a:p>
+          <a:p>
+            <a:r>
+              <a:rPr lang="en-GB" sz="1400" dirty="0" smtClean="0"/>
+              <a:t>      =&gt; Look at links in other PowerPoint (or buy </a:t>
+            </a:r>
+            <a:r>
+              <a:rPr lang="en-GB" sz="1400" dirty="0" err="1" smtClean="0"/>
+              <a:t>plugin</a:t>
+            </a:r>
+            <a:r>
+              <a:rPr lang="en-GB" sz="1400" dirty="0" smtClean="0"/>
+              <a:t>...)</a:t>
+            </a:r>
+          </a:p>
+          <a:p>
+            <a:r>
+              <a:rPr lang="en-GB" sz="1400" dirty="0" smtClean="0"/>
+              <a:t>        - </a:t>
+            </a:r>
+            <a:r>
+              <a:rPr lang="en-GB" sz="1400" dirty="0" err="1" smtClean="0"/>
+              <a:t>OpenCV</a:t>
+            </a:r>
+            <a:r>
+              <a:rPr lang="en-GB" sz="1400" dirty="0" smtClean="0"/>
+              <a:t> in Unity:</a:t>
+            </a:r>
+          </a:p>
+          <a:p>
+            <a:r>
+              <a:rPr lang="en-GB" sz="1400" dirty="0" smtClean="0"/>
+              <a:t>          - </a:t>
+            </a:r>
+            <a:r>
+              <a:rPr lang="en-GB" sz="1400" dirty="0" err="1" smtClean="0"/>
+              <a:t>OpenCV</a:t>
+            </a:r>
+            <a:r>
+              <a:rPr lang="en-GB" sz="1400" dirty="0" smtClean="0"/>
+              <a:t> Unity Asset</a:t>
+            </a:r>
+          </a:p>
+          <a:p>
+            <a:r>
+              <a:rPr lang="en-GB" sz="1400" dirty="0" smtClean="0"/>
+              <a:t>            https://assetstore.unity.com/packages/tools/integration/opencv-for-unity-21088</a:t>
+            </a:r>
+          </a:p>
+          <a:p>
+            <a:r>
+              <a:rPr lang="en-GB" sz="1400" dirty="0" smtClean="0"/>
+              <a:t>            ! - BUT: Not free!</a:t>
+            </a:r>
+          </a:p>
+          <a:p>
+            <a:r>
+              <a:rPr lang="en-GB" sz="1400" dirty="0" smtClean="0"/>
+              <a:t>        - </a:t>
+            </a:r>
+            <a:r>
+              <a:rPr lang="en-GB" sz="1400" dirty="0" err="1" smtClean="0"/>
+              <a:t>OpenCV</a:t>
+            </a:r>
+            <a:r>
+              <a:rPr lang="en-GB" sz="1400" dirty="0" smtClean="0"/>
+              <a:t> from sources</a:t>
+            </a:r>
+          </a:p>
+          <a:p>
+            <a:r>
+              <a:rPr lang="en-GB" sz="1400" dirty="0" smtClean="0"/>
+              <a:t>            http://amin-ahmadi.com/2017/05/24/how-to-use-opencv-in-unity-example-project/</a:t>
+            </a:r>
+          </a:p>
+          <a:p>
+            <a:r>
+              <a:rPr lang="en-GB" sz="1400" dirty="0" smtClean="0"/>
+              <a:t>            https://thomasmountainborn.com/2016/09/11/unity-and-opencv-part-one-install/</a:t>
+            </a:r>
+          </a:p>
+          <a:p>
+            <a:r>
+              <a:rPr lang="en-GB" sz="1400" dirty="0" smtClean="0"/>
+              <a:t>            https://www.raywenderlich.com/5475-introduction-to-using-opencv-with-unity</a:t>
+            </a:r>
+          </a:p>
+          <a:p>
+            <a:r>
+              <a:rPr lang="en-GB" sz="1400" dirty="0" smtClean="0"/>
+              <a:t>      Others:</a:t>
+            </a:r>
+          </a:p>
+          <a:p>
+            <a:r>
+              <a:rPr lang="en-GB" sz="1400" dirty="0" smtClean="0"/>
+              <a:t>      - </a:t>
+            </a:r>
+            <a:r>
+              <a:rPr lang="en-GB" sz="1400" dirty="0" err="1" smtClean="0"/>
+              <a:t>OpenCV</a:t>
+            </a:r>
+            <a:r>
+              <a:rPr lang="en-GB" sz="1400" dirty="0" smtClean="0"/>
+              <a:t> &amp; Unity using sockets:</a:t>
+            </a:r>
+          </a:p>
+          <a:p>
+            <a:r>
+              <a:rPr lang="en-GB" sz="1400" dirty="0" smtClean="0"/>
+              <a:t>        https://github.com/hasanavi/OpenCV-Unity3D-Object-Tracking</a:t>
+            </a:r>
+          </a:p>
+          <a:p>
+            <a:r>
+              <a:rPr lang="en-GB" sz="1400" dirty="0" smtClean="0"/>
+              <a:t>        =&gt; Not ideal, as </a:t>
+            </a:r>
+            <a:r>
+              <a:rPr lang="en-GB" sz="1400" dirty="0" err="1" smtClean="0"/>
+              <a:t>Kinect</a:t>
+            </a:r>
+            <a:r>
+              <a:rPr lang="en-GB" sz="1400" dirty="0" smtClean="0"/>
+              <a:t> already integrated in Unity</a:t>
+            </a:r>
+            <a:r>
+              <a:rPr lang="en-GB" sz="1400" dirty="0" smtClean="0"/>
+              <a:t>.</a:t>
+            </a:r>
+            <a:endParaRPr lang="en-GB" sz="1400" dirty="0" smtClean="0"/>
+          </a:p>
+        </p:txBody>
+      </p:sp>
+      <p:sp>
+        <p:nvSpPr>
+          <p:cNvPr id="18" name="ZoneTexte 17"/>
+          <p:cNvSpPr txBox="1"/>
+          <p:nvPr/>
+        </p:nvSpPr>
+        <p:spPr>
+          <a:xfrm>
+            <a:off x="323528" y="260648"/>
+            <a:ext cx="2077235" cy="461665"/>
+          </a:xfrm>
+          <a:prstGeom prst="rect">
+            <a:avLst/>
+          </a:prstGeom>
+          <a:noFill/>
+        </p:spPr>
+        <p:txBody>
+          <a:bodyPr wrap="none" rtlCol="0">
+            <a:spAutoFit/>
+          </a:bodyPr>
+          <a:lstStyle/>
+          <a:p>
+            <a:r>
+              <a:rPr lang="en-GB" sz="2400" b="1" dirty="0" smtClean="0"/>
+              <a:t>CLIENT – HEAD</a:t>
+            </a:r>
+          </a:p>
+        </p:txBody>
+      </p:sp>
+      <p:sp>
+        <p:nvSpPr>
+          <p:cNvPr id="13" name="ZoneTexte 12"/>
+          <p:cNvSpPr txBox="1"/>
+          <p:nvPr/>
+        </p:nvSpPr>
+        <p:spPr>
+          <a:xfrm>
+            <a:off x="3491880" y="404664"/>
+            <a:ext cx="1885196" cy="461665"/>
+          </a:xfrm>
+          <a:prstGeom prst="rect">
+            <a:avLst/>
+          </a:prstGeom>
+          <a:noFill/>
+        </p:spPr>
+        <p:txBody>
+          <a:bodyPr wrap="none" rtlCol="0">
+            <a:spAutoFit/>
+          </a:bodyPr>
+          <a:lstStyle/>
+          <a:p>
+            <a:r>
+              <a:rPr lang="en-GB" sz="2400" b="1" dirty="0" smtClean="0">
+                <a:solidFill>
+                  <a:srgbClr val="FF0000"/>
+                </a:solidFill>
+              </a:rPr>
+              <a:t>!!!! TODO !!!!</a:t>
+            </a:r>
+          </a:p>
+        </p:txBody>
+      </p:sp>
+    </p:spTree>
+  </p:cSld>
+  <p:clrMapOvr>
+    <a:masterClrMapping/>
+  </p:clrMapOvr>
+  <p:timing>
+    <p:tnLst>
+      <p:par>
+        <p:cTn id="1" dur="indefinite" restart="never" nodeType="tmRoot"/>
+      </p:par>
+    </p:tnLst>
+  </p:timing>
+</p:sld>
+</file>
+
+<file path=ppt/slides/slide14.xml><?xml version="1.0" encoding="utf-8"?>
+<p:sld xmlns:a="http://schemas.openxmlformats.org/drawingml/2006/main" xmlns:r="http://schemas.openxmlformats.org/officeDocument/2006/relationships" xmlns:p="http://schemas.openxmlformats.org/presentationml/2006/main">
+  <p:cSld>
+    <p:spTree>
+      <p:nvGrpSpPr>
+        <p:cNvPr id="1" name=""/>
+        <p:cNvGrpSpPr/>
+        <p:nvPr/>
+      </p:nvGrpSpPr>
+      <p:grpSpPr>
+        <a:xfrm>
+          <a:off x="0" y="0"/>
+          <a:ext cx="0" cy="0"/>
+          <a:chOff x="0" y="0"/>
+          <a:chExt cx="0" cy="0"/>
+        </a:xfrm>
+      </p:grpSpPr>
+      <p:sp>
+        <p:nvSpPr>
+          <p:cNvPr id="17" name="ZoneTexte 16"/>
+          <p:cNvSpPr txBox="1"/>
+          <p:nvPr/>
+        </p:nvSpPr>
+        <p:spPr>
+          <a:xfrm>
+            <a:off x="899592" y="1052736"/>
+            <a:ext cx="8223020" cy="5632311"/>
+          </a:xfrm>
+          <a:prstGeom prst="rect">
+            <a:avLst/>
+          </a:prstGeom>
+          <a:noFill/>
+        </p:spPr>
+        <p:txBody>
+          <a:bodyPr wrap="none" rtlCol="0">
+            <a:spAutoFit/>
+          </a:bodyPr>
+          <a:lstStyle/>
+          <a:p>
+            <a:r>
+              <a:rPr lang="en-GB" b="1" u="sng" dirty="0" smtClean="0"/>
+              <a:t>HEAD TRACKING:</a:t>
+            </a:r>
+          </a:p>
+          <a:p>
+            <a:r>
+              <a:rPr lang="en-GB" sz="1400" dirty="0" smtClean="0"/>
+              <a:t>LOOK AT:</a:t>
+            </a:r>
+          </a:p>
+          <a:p>
+            <a:r>
+              <a:rPr lang="en-GB" sz="1400" dirty="0" smtClean="0"/>
+              <a:t>- </a:t>
+            </a:r>
+            <a:r>
+              <a:rPr lang="en-GB" sz="1400" dirty="0" err="1" smtClean="0"/>
+              <a:t>Kinect</a:t>
+            </a:r>
+            <a:r>
+              <a:rPr lang="en-GB" sz="1400" dirty="0" smtClean="0"/>
+              <a:t> Colour </a:t>
+            </a:r>
+            <a:r>
+              <a:rPr lang="en-GB" sz="1400" dirty="0" smtClean="0"/>
+              <a:t>tracking:</a:t>
+            </a:r>
+          </a:p>
+          <a:p>
+            <a:r>
+              <a:rPr lang="en-GB" sz="1400" dirty="0" smtClean="0"/>
+              <a:t>  - How to Detect and Track Red, Green and Blue </a:t>
+            </a:r>
+            <a:r>
+              <a:rPr lang="en-GB" sz="1400" dirty="0" err="1" smtClean="0"/>
+              <a:t>Colored</a:t>
+            </a:r>
+            <a:r>
+              <a:rPr lang="en-GB" sz="1400" dirty="0" smtClean="0"/>
+              <a:t> Object in LIVE Video:</a:t>
+            </a:r>
+          </a:p>
+          <a:p>
+            <a:r>
+              <a:rPr lang="en-GB" sz="1000" dirty="0" smtClean="0"/>
+              <a:t>    </a:t>
+            </a:r>
+            <a:r>
+              <a:rPr lang="en-GB" sz="1000" dirty="0" smtClean="0">
+                <a:hlinkClick r:id="rId2"/>
+              </a:rPr>
+              <a:t>https://</a:t>
+            </a:r>
+            <a:r>
+              <a:rPr lang="en-GB" sz="1000" dirty="0" smtClean="0">
+                <a:hlinkClick r:id="rId2"/>
+              </a:rPr>
+              <a:t>www.mathworks.com/matlabcentral/fileexchange/40154-how-to-detect-and-track-red-green-and-blue-colored-object-in-live-video</a:t>
+            </a:r>
+            <a:endParaRPr lang="en-GB" sz="1000" dirty="0" smtClean="0"/>
+          </a:p>
+          <a:p>
+            <a:endParaRPr lang="en-GB" sz="1400" dirty="0" smtClean="0"/>
+          </a:p>
+          <a:p>
+            <a:r>
+              <a:rPr lang="en-GB" sz="1400" dirty="0" smtClean="0"/>
+              <a:t>    - </a:t>
+            </a:r>
+            <a:r>
+              <a:rPr lang="en-GB" sz="1400" dirty="0" err="1" smtClean="0"/>
+              <a:t>OpenCV</a:t>
+            </a:r>
+            <a:r>
+              <a:rPr lang="en-GB" sz="1400" dirty="0" smtClean="0"/>
+              <a:t> </a:t>
+            </a:r>
+            <a:r>
+              <a:rPr lang="en-GB" sz="1400" dirty="0" err="1" smtClean="0"/>
+              <a:t>color</a:t>
+            </a:r>
+            <a:r>
+              <a:rPr lang="en-GB" sz="1400" dirty="0" smtClean="0"/>
+              <a:t> detection</a:t>
+            </a:r>
+          </a:p>
+          <a:p>
+            <a:r>
+              <a:rPr lang="en-GB" sz="1400" dirty="0" smtClean="0"/>
+              <a:t>      - Colour tracking in Unity (using </a:t>
+            </a:r>
+            <a:r>
+              <a:rPr lang="en-GB" sz="1400" dirty="0" err="1" smtClean="0"/>
+              <a:t>OpenCV</a:t>
+            </a:r>
+            <a:r>
+              <a:rPr lang="en-GB" sz="1400" dirty="0" smtClean="0"/>
+              <a:t> </a:t>
+            </a:r>
+            <a:r>
+              <a:rPr lang="en-GB" sz="1400" dirty="0" err="1" smtClean="0"/>
+              <a:t>plugin</a:t>
+            </a:r>
+            <a:r>
+              <a:rPr lang="en-GB" sz="1400" dirty="0" smtClean="0"/>
+              <a:t>...)</a:t>
+            </a:r>
+          </a:p>
+          <a:p>
+            <a:r>
+              <a:rPr lang="en-GB" sz="1400" dirty="0" smtClean="0"/>
+              <a:t>        https://handmap.github.io/opencv-colour-tracking-unity3d/</a:t>
+            </a:r>
+          </a:p>
+          <a:p>
+            <a:r>
+              <a:rPr lang="en-GB" sz="1400" dirty="0" smtClean="0"/>
+              <a:t>      - Invisibility Cloak using </a:t>
+            </a:r>
+            <a:r>
+              <a:rPr lang="en-GB" sz="1400" dirty="0" err="1" smtClean="0"/>
+              <a:t>Color</a:t>
+            </a:r>
+            <a:r>
+              <a:rPr lang="en-GB" sz="1400" dirty="0" smtClean="0"/>
+              <a:t> Detection and Segmentation with </a:t>
+            </a:r>
+            <a:r>
+              <a:rPr lang="en-GB" sz="1400" dirty="0" err="1" smtClean="0"/>
+              <a:t>OpenCV</a:t>
+            </a:r>
+            <a:r>
+              <a:rPr lang="en-GB" sz="1400" dirty="0" smtClean="0"/>
+              <a:t>:</a:t>
+            </a:r>
+          </a:p>
+          <a:p>
+            <a:r>
+              <a:rPr lang="en-GB" sz="1400" dirty="0" smtClean="0"/>
+              <a:t>        https://www.learnopencv.com/invisibility-cloak-using-color-detection-and-segmentation-with-opencv/</a:t>
+            </a:r>
+          </a:p>
+          <a:p>
+            <a:r>
+              <a:rPr lang="en-GB" sz="1400" dirty="0" smtClean="0"/>
+              <a:t>        (Need to subscribe to download the code)</a:t>
+            </a:r>
+          </a:p>
+          <a:p>
+            <a:r>
+              <a:rPr lang="en-GB" sz="1400" dirty="0" smtClean="0"/>
+              <a:t>      - Blob Detection Using </a:t>
+            </a:r>
+            <a:r>
+              <a:rPr lang="en-GB" sz="1400" dirty="0" err="1" smtClean="0"/>
+              <a:t>OpenCV</a:t>
+            </a:r>
+            <a:r>
+              <a:rPr lang="en-GB" sz="1400" dirty="0" smtClean="0"/>
+              <a:t> (using </a:t>
+            </a:r>
+            <a:r>
+              <a:rPr lang="en-GB" sz="1400" dirty="0" err="1" smtClean="0"/>
+              <a:t>SimpleBlobDetector</a:t>
+            </a:r>
+            <a:r>
+              <a:rPr lang="en-GB" sz="1400" dirty="0" smtClean="0"/>
+              <a:t>):</a:t>
+            </a:r>
+          </a:p>
+          <a:p>
+            <a:r>
+              <a:rPr lang="en-GB" sz="1400" dirty="0" smtClean="0"/>
+              <a:t>        https://www.learnopencv.com/blob-detection-using-opencv-python-c/</a:t>
+            </a:r>
+          </a:p>
+          <a:p>
+            <a:r>
+              <a:rPr lang="en-GB" sz="1400" dirty="0" smtClean="0"/>
+              <a:t>        https://docs.opencv.org/3.4.3/d0/d7a/classcv_1_1SimpleBlobDetector.html</a:t>
+            </a:r>
+          </a:p>
+          <a:p>
+            <a:r>
+              <a:rPr lang="en-GB" sz="1400" dirty="0" smtClean="0"/>
+              <a:t>      - Circular bob detection:</a:t>
+            </a:r>
+          </a:p>
+          <a:p>
+            <a:r>
+              <a:rPr lang="en-GB" sz="1400" dirty="0" smtClean="0"/>
+              <a:t>        https://riptutorial.com/opencv/example/22518/circular-blob-detection</a:t>
+            </a:r>
+          </a:p>
+          <a:p>
+            <a:r>
+              <a:rPr lang="en-GB" sz="1400" dirty="0" smtClean="0"/>
+              <a:t>      !- Fast </a:t>
+            </a:r>
+            <a:r>
+              <a:rPr lang="en-GB" sz="1400" dirty="0" err="1" smtClean="0"/>
+              <a:t>Color</a:t>
+            </a:r>
+            <a:r>
+              <a:rPr lang="en-GB" sz="1400" dirty="0" smtClean="0"/>
+              <a:t> Based Object Tracking Using </a:t>
+            </a:r>
+            <a:r>
+              <a:rPr lang="en-GB" sz="1400" dirty="0" err="1" smtClean="0"/>
+              <a:t>OpenCV</a:t>
+            </a:r>
+            <a:r>
+              <a:rPr lang="en-GB" sz="1400" dirty="0" smtClean="0"/>
+              <a:t> and </a:t>
+            </a:r>
+            <a:r>
+              <a:rPr lang="en-GB" sz="1400" dirty="0" err="1" smtClean="0"/>
+              <a:t>Kinect</a:t>
+            </a:r>
+            <a:endParaRPr lang="en-GB" sz="1400" dirty="0" smtClean="0"/>
+          </a:p>
+          <a:p>
+            <a:r>
+              <a:rPr lang="en-GB" sz="1400" dirty="0" smtClean="0"/>
+              <a:t>        https://imufeed.wordpress.com/2013/04/03/fast-color-based-object-tracking-using-opencv-and-kinect/</a:t>
+            </a:r>
+          </a:p>
+          <a:p>
+            <a:r>
+              <a:rPr lang="en-GB" sz="1400" dirty="0" smtClean="0"/>
+              <a:t>        https://www.youtube.com/watch?v=d_c0Bqqvj6c</a:t>
+            </a:r>
+          </a:p>
+          <a:p>
+            <a:r>
+              <a:rPr lang="en-GB" sz="1400" dirty="0" smtClean="0"/>
+              <a:t>      - </a:t>
+            </a:r>
+            <a:r>
+              <a:rPr lang="en-GB" sz="1400" dirty="0" err="1" smtClean="0"/>
+              <a:t>Color</a:t>
+            </a:r>
+            <a:r>
+              <a:rPr lang="en-GB" sz="1400" dirty="0" smtClean="0"/>
+              <a:t> Based Object Tracking Using Open </a:t>
+            </a:r>
+            <a:r>
+              <a:rPr lang="en-GB" sz="1400" dirty="0" err="1" smtClean="0"/>
+              <a:t>Kinect</a:t>
+            </a:r>
+            <a:r>
+              <a:rPr lang="en-GB" sz="1400" dirty="0" smtClean="0"/>
+              <a:t> and Processing</a:t>
+            </a:r>
+          </a:p>
+          <a:p>
+            <a:r>
+              <a:rPr lang="en-GB" sz="1400" dirty="0" smtClean="0"/>
+              <a:t>        http://www.nbertagnolli.com/jekyll/update/2015/10/13/Object_Tracking.html</a:t>
+            </a:r>
+          </a:p>
+          <a:p>
+            <a:endParaRPr lang="en-GB" sz="1400" dirty="0" smtClean="0"/>
+          </a:p>
+          <a:p>
+            <a:r>
+              <a:rPr lang="en-GB" sz="1400" dirty="0" smtClean="0"/>
+              <a:t>    - object pose estimation</a:t>
+            </a:r>
+          </a:p>
+          <a:p>
+            <a:r>
+              <a:rPr lang="en-GB" sz="1400" dirty="0" smtClean="0"/>
+              <a:t>      =&gt; Might not need to use specific algorithms: only need to determine orientation from the different points.</a:t>
+            </a:r>
+          </a:p>
+        </p:txBody>
+      </p:sp>
+      <p:sp>
+        <p:nvSpPr>
+          <p:cNvPr id="18" name="ZoneTexte 17"/>
+          <p:cNvSpPr txBox="1"/>
+          <p:nvPr/>
+        </p:nvSpPr>
+        <p:spPr>
+          <a:xfrm>
+            <a:off x="323528" y="260648"/>
+            <a:ext cx="2077235" cy="461665"/>
+          </a:xfrm>
+          <a:prstGeom prst="rect">
+            <a:avLst/>
+          </a:prstGeom>
+          <a:noFill/>
+        </p:spPr>
+        <p:txBody>
+          <a:bodyPr wrap="none" rtlCol="0">
+            <a:spAutoFit/>
+          </a:bodyPr>
+          <a:lstStyle/>
+          <a:p>
+            <a:r>
+              <a:rPr lang="en-GB" sz="2400" b="1" dirty="0" smtClean="0"/>
+              <a:t>CLIENT – HEAD</a:t>
+            </a:r>
+          </a:p>
+        </p:txBody>
+      </p:sp>
+      <p:sp>
+        <p:nvSpPr>
+          <p:cNvPr id="13" name="ZoneTexte 12"/>
+          <p:cNvSpPr txBox="1"/>
+          <p:nvPr/>
+        </p:nvSpPr>
+        <p:spPr>
+          <a:xfrm>
+            <a:off x="3491880" y="404664"/>
+            <a:ext cx="1885196" cy="461665"/>
+          </a:xfrm>
+          <a:prstGeom prst="rect">
+            <a:avLst/>
+          </a:prstGeom>
+          <a:noFill/>
+        </p:spPr>
+        <p:txBody>
+          <a:bodyPr wrap="none" rtlCol="0">
+            <a:spAutoFit/>
+          </a:bodyPr>
+          <a:lstStyle/>
+          <a:p>
+            <a:r>
+              <a:rPr lang="en-GB" sz="2400" b="1" dirty="0" smtClean="0">
+                <a:solidFill>
+                  <a:srgbClr val="FF0000"/>
+                </a:solidFill>
+              </a:rPr>
+              <a:t>!!!! TODO !!!!</a:t>
+            </a:r>
+          </a:p>
+        </p:txBody>
+      </p:sp>
+    </p:spTree>
+  </p:cSld>
+  <p:clrMapOvr>
+    <a:masterClrMapping/>
+  </p:clrMapOvr>
+  <p:timing>
+    <p:tnLst>
+      <p:par>
+        <p:cTn id="1" dur="indefinite" restart="never" nodeType="tmRoot"/>
+      </p:par>
+    </p:tnLst>
+  </p:timing>
+</p:sld>
+</file>
+
+<file path=ppt/slides/slide15.xml><?xml version="1.0" encoding="utf-8"?>
+<p:sld xmlns:a="http://schemas.openxmlformats.org/drawingml/2006/main" xmlns:r="http://schemas.openxmlformats.org/officeDocument/2006/relationships" xmlns:p="http://schemas.openxmlformats.org/presentationml/2006/main">
+  <p:cSld>
+    <p:spTree>
+      <p:nvGrpSpPr>
+        <p:cNvPr id="1" name=""/>
+        <p:cNvGrpSpPr/>
+        <p:nvPr/>
+      </p:nvGrpSpPr>
+      <p:grpSpPr>
+        <a:xfrm>
+          <a:off x="0" y="0"/>
+          <a:ext cx="0" cy="0"/>
+          <a:chOff x="0" y="0"/>
+          <a:chExt cx="0" cy="0"/>
+        </a:xfrm>
+      </p:grpSpPr>
+      <p:sp>
+        <p:nvSpPr>
+          <p:cNvPr id="17" name="ZoneTexte 16"/>
+          <p:cNvSpPr txBox="1"/>
+          <p:nvPr/>
+        </p:nvSpPr>
+        <p:spPr>
+          <a:xfrm>
+            <a:off x="899592" y="1052736"/>
+            <a:ext cx="7685181" cy="3170099"/>
+          </a:xfrm>
+          <a:prstGeom prst="rect">
+            <a:avLst/>
+          </a:prstGeom>
+          <a:noFill/>
+        </p:spPr>
+        <p:txBody>
+          <a:bodyPr wrap="none" rtlCol="0">
+            <a:spAutoFit/>
+          </a:bodyPr>
+          <a:lstStyle/>
+          <a:p>
+            <a:r>
+              <a:rPr lang="en-GB" b="1" u="sng" dirty="0" smtClean="0"/>
+              <a:t>HEAD TRACKING:</a:t>
+            </a:r>
+          </a:p>
+          <a:p>
+            <a:endParaRPr lang="en-GB" sz="1400" b="1" u="sng" dirty="0" smtClean="0"/>
+          </a:p>
+          <a:p>
+            <a:r>
+              <a:rPr lang="en-GB" sz="1400" u="sng" dirty="0" smtClean="0"/>
+              <a:t>Alternative:</a:t>
+            </a:r>
+            <a:r>
+              <a:rPr lang="en-GB" sz="1400" dirty="0" smtClean="0"/>
+              <a:t> WII Remote tracking (1)</a:t>
+            </a:r>
+          </a:p>
+          <a:p>
+            <a:endParaRPr lang="en-GB" sz="1400" dirty="0" smtClean="0"/>
+          </a:p>
+          <a:p>
+            <a:r>
+              <a:rPr lang="en-GB" sz="1400" dirty="0" smtClean="0"/>
+              <a:t>- </a:t>
+            </a:r>
+            <a:r>
+              <a:rPr lang="en-GB" sz="1400" dirty="0" smtClean="0"/>
+              <a:t>Tracking using </a:t>
+            </a:r>
+            <a:r>
+              <a:rPr lang="en-GB" sz="1400" dirty="0" err="1" smtClean="0"/>
+              <a:t>Wii</a:t>
+            </a:r>
+            <a:r>
+              <a:rPr lang="en-GB" sz="1400" dirty="0" smtClean="0"/>
+              <a:t> Remote</a:t>
+            </a:r>
+          </a:p>
+          <a:p>
+            <a:r>
+              <a:rPr lang="en-GB" sz="1400" dirty="0" smtClean="0"/>
+              <a:t>  =&gt; LED tracking by IR camera on </a:t>
+            </a:r>
+            <a:r>
+              <a:rPr lang="en-GB" sz="1400" dirty="0" err="1" smtClean="0"/>
+              <a:t>Wiimote</a:t>
+            </a:r>
+            <a:endParaRPr lang="en-GB" sz="1400" dirty="0" smtClean="0"/>
+          </a:p>
+          <a:p>
+            <a:r>
+              <a:rPr lang="en-GB" sz="1400" dirty="0" smtClean="0"/>
+              <a:t>  - Need extra installation for LED lights</a:t>
+            </a:r>
+          </a:p>
+          <a:p>
+            <a:r>
+              <a:rPr lang="en-GB" sz="1400" dirty="0" smtClean="0"/>
+              <a:t>  - Need more than a sensor bar (viewing angle of </a:t>
+            </a:r>
+            <a:r>
+              <a:rPr lang="en-GB" sz="1400" dirty="0" err="1" smtClean="0"/>
+              <a:t>Wiimote</a:t>
+            </a:r>
+            <a:r>
+              <a:rPr lang="en-GB" sz="1400" dirty="0" smtClean="0"/>
+              <a:t> only around 40°)</a:t>
+            </a:r>
+          </a:p>
+          <a:p>
+            <a:r>
+              <a:rPr lang="en-GB" sz="1400" dirty="0" smtClean="0"/>
+              <a:t>    =&gt; Use several LEDs beacon covering the whole gaming area (at least front &amp; sides)</a:t>
+            </a:r>
+          </a:p>
+          <a:p>
+            <a:endParaRPr lang="en-GB" sz="1400" dirty="0" smtClean="0"/>
+          </a:p>
+          <a:p>
+            <a:r>
+              <a:rPr lang="en-GB" sz="1400" dirty="0" smtClean="0"/>
+              <a:t>=&gt; The </a:t>
+            </a:r>
+            <a:r>
+              <a:rPr lang="en-GB" sz="1400" dirty="0" smtClean="0"/>
+              <a:t>simplest solution is to only use </a:t>
+            </a:r>
+            <a:r>
+              <a:rPr lang="en-GB" sz="1400" dirty="0" err="1" smtClean="0"/>
+              <a:t>Kinect</a:t>
+            </a:r>
+            <a:r>
+              <a:rPr lang="en-GB" sz="1400" dirty="0" smtClean="0"/>
+              <a:t> tracking (easier hardware setup and software processing).</a:t>
+            </a:r>
+          </a:p>
+          <a:p>
+            <a:r>
+              <a:rPr lang="en-GB" sz="1400" dirty="0" smtClean="0"/>
+              <a:t>But maybe the </a:t>
+            </a:r>
+            <a:r>
+              <a:rPr lang="en-GB" sz="1400" dirty="0" err="1" smtClean="0"/>
+              <a:t>Wiimote</a:t>
+            </a:r>
+            <a:r>
+              <a:rPr lang="en-GB" sz="1400" dirty="0" smtClean="0"/>
+              <a:t> tracking would be more precise (&amp; already gives the transformation).</a:t>
+            </a:r>
+          </a:p>
+          <a:p>
+            <a:endParaRPr lang="en-GB" sz="1400" dirty="0" smtClean="0"/>
+          </a:p>
+          <a:p>
+            <a:endParaRPr lang="en-GB" sz="1400" dirty="0" smtClean="0"/>
+          </a:p>
+        </p:txBody>
+      </p:sp>
+      <p:sp>
+        <p:nvSpPr>
+          <p:cNvPr id="18" name="ZoneTexte 17"/>
+          <p:cNvSpPr txBox="1"/>
+          <p:nvPr/>
+        </p:nvSpPr>
+        <p:spPr>
+          <a:xfrm>
+            <a:off x="323528" y="260648"/>
+            <a:ext cx="2077235" cy="461665"/>
+          </a:xfrm>
+          <a:prstGeom prst="rect">
+            <a:avLst/>
+          </a:prstGeom>
+          <a:noFill/>
+        </p:spPr>
+        <p:txBody>
+          <a:bodyPr wrap="none" rtlCol="0">
+            <a:spAutoFit/>
+          </a:bodyPr>
+          <a:lstStyle/>
+          <a:p>
+            <a:r>
+              <a:rPr lang="en-GB" sz="2400" b="1" dirty="0" smtClean="0"/>
+              <a:t>CLIENT – HEAD</a:t>
+            </a:r>
+          </a:p>
+        </p:txBody>
+      </p:sp>
+      <p:sp>
+        <p:nvSpPr>
+          <p:cNvPr id="13" name="ZoneTexte 12"/>
+          <p:cNvSpPr txBox="1"/>
+          <p:nvPr/>
+        </p:nvSpPr>
+        <p:spPr>
+          <a:xfrm>
+            <a:off x="3491880" y="404664"/>
+            <a:ext cx="1885196" cy="461665"/>
+          </a:xfrm>
+          <a:prstGeom prst="rect">
+            <a:avLst/>
+          </a:prstGeom>
+          <a:noFill/>
+        </p:spPr>
+        <p:txBody>
+          <a:bodyPr wrap="none" rtlCol="0">
+            <a:spAutoFit/>
+          </a:bodyPr>
+          <a:lstStyle/>
+          <a:p>
+            <a:r>
+              <a:rPr lang="en-GB" sz="2400" b="1" dirty="0" smtClean="0">
+                <a:solidFill>
+                  <a:srgbClr val="FF0000"/>
+                </a:solidFill>
+              </a:rPr>
+              <a:t>!!!! TODO !!!!</a:t>
+            </a:r>
+          </a:p>
+        </p:txBody>
+      </p:sp>
+    </p:spTree>
+  </p:cSld>
+  <p:clrMapOvr>
+    <a:masterClrMapping/>
+  </p:clrMapOvr>
+  <p:timing>
+    <p:tnLst>
+      <p:par>
+        <p:cTn id="1" dur="indefinite" restart="never" nodeType="tmRoot"/>
+      </p:par>
+    </p:tnLst>
+  </p:timing>
+</p:sld>
+</file>
+
+<file path=ppt/slides/slide16.xml><?xml version="1.0" encoding="utf-8"?>
+<p:sld xmlns:a="http://schemas.openxmlformats.org/drawingml/2006/main" xmlns:r="http://schemas.openxmlformats.org/officeDocument/2006/relationships" xmlns:p="http://schemas.openxmlformats.org/presentationml/2006/main">
+  <p:cSld>
+    <p:spTree>
+      <p:nvGrpSpPr>
+        <p:cNvPr id="1" name=""/>
+        <p:cNvGrpSpPr/>
+        <p:nvPr/>
+      </p:nvGrpSpPr>
+      <p:grpSpPr>
+        <a:xfrm>
+          <a:off x="0" y="0"/>
+          <a:ext cx="0" cy="0"/>
+          <a:chOff x="0" y="0"/>
+          <a:chExt cx="0" cy="0"/>
+        </a:xfrm>
+      </p:grpSpPr>
+      <p:sp>
+        <p:nvSpPr>
+          <p:cNvPr id="17" name="ZoneTexte 16"/>
+          <p:cNvSpPr txBox="1"/>
+          <p:nvPr/>
+        </p:nvSpPr>
+        <p:spPr>
+          <a:xfrm>
+            <a:off x="899592" y="1052736"/>
+            <a:ext cx="7297190" cy="5724644"/>
+          </a:xfrm>
+          <a:prstGeom prst="rect">
+            <a:avLst/>
+          </a:prstGeom>
+          <a:noFill/>
+        </p:spPr>
+        <p:txBody>
+          <a:bodyPr wrap="none" rtlCol="0">
+            <a:spAutoFit/>
+          </a:bodyPr>
+          <a:lstStyle/>
+          <a:p>
+            <a:r>
+              <a:rPr lang="en-GB" b="1" u="sng" dirty="0" smtClean="0"/>
+              <a:t>HEAD TRACKING:</a:t>
+            </a:r>
+          </a:p>
+          <a:p>
+            <a:endParaRPr lang="en-GB" sz="1400" b="1" u="sng" dirty="0" smtClean="0"/>
+          </a:p>
+          <a:p>
+            <a:r>
+              <a:rPr lang="en-GB" sz="1400" u="sng" dirty="0" smtClean="0"/>
+              <a:t>Alternative:</a:t>
+            </a:r>
+            <a:r>
+              <a:rPr lang="en-GB" sz="1400" dirty="0" smtClean="0"/>
+              <a:t> WII Remote tracking (2)</a:t>
+            </a:r>
+          </a:p>
+          <a:p>
+            <a:endParaRPr lang="en-GB" sz="1000" dirty="0" smtClean="0"/>
+          </a:p>
+          <a:p>
+            <a:r>
+              <a:rPr lang="en-GB" sz="1000" dirty="0" smtClean="0"/>
+              <a:t>"The </a:t>
+            </a:r>
+            <a:r>
+              <a:rPr lang="en-GB" sz="1000" dirty="0" err="1" smtClean="0"/>
+              <a:t>Wii</a:t>
+            </a:r>
+            <a:r>
+              <a:rPr lang="en-GB" sz="1000" dirty="0" smtClean="0"/>
+              <a:t> IR camera [...] has an integrated processor which outputs the X and Y positions and size of the 4 brightest IR points that is sees."</a:t>
+            </a:r>
+          </a:p>
+          <a:p>
+            <a:endParaRPr lang="en-GB" sz="1000" dirty="0" smtClean="0"/>
+          </a:p>
+          <a:p>
+            <a:r>
+              <a:rPr lang="en-GB" sz="1000" dirty="0" smtClean="0"/>
+              <a:t>- Can get position &amp; orientation with custom 4 LEDs beacon</a:t>
+            </a:r>
+          </a:p>
+          <a:p>
+            <a:r>
+              <a:rPr lang="en-GB" sz="1000" dirty="0" smtClean="0"/>
+              <a:t>  - 6DOF Positional Tracking with the </a:t>
+            </a:r>
+            <a:r>
+              <a:rPr lang="en-GB" sz="1000" dirty="0" err="1" smtClean="0"/>
+              <a:t>Wiimote</a:t>
+            </a:r>
+            <a:endParaRPr lang="en-GB" sz="1000" dirty="0" smtClean="0"/>
+          </a:p>
+          <a:p>
+            <a:r>
+              <a:rPr lang="en-GB" sz="1000" dirty="0" smtClean="0"/>
+              <a:t>    https://franklinta.com/2014/09/30/6dof-positional-tracking-with-the-wiimote/</a:t>
+            </a:r>
+          </a:p>
+          <a:p>
+            <a:r>
+              <a:rPr lang="en-GB" sz="1000" dirty="0" smtClean="0"/>
+              <a:t>  - Tracking using </a:t>
+            </a:r>
+            <a:r>
+              <a:rPr lang="en-GB" sz="1000" dirty="0" err="1" smtClean="0"/>
+              <a:t>Wiimote</a:t>
+            </a:r>
+            <a:endParaRPr lang="en-GB" sz="1000" dirty="0" smtClean="0"/>
+          </a:p>
+          <a:p>
+            <a:r>
+              <a:rPr lang="en-GB" sz="1000" dirty="0" smtClean="0"/>
+              <a:t>    https://www.youtube.com/watch?v=KyvIlKSA0BA</a:t>
+            </a:r>
+          </a:p>
+          <a:p>
+            <a:r>
+              <a:rPr lang="en-GB" sz="1000" dirty="0" smtClean="0"/>
+              <a:t>  - </a:t>
+            </a:r>
+            <a:r>
+              <a:rPr lang="en-GB" sz="1000" dirty="0" err="1" smtClean="0"/>
+              <a:t>VRHome</a:t>
+            </a:r>
+            <a:r>
+              <a:rPr lang="en-GB" sz="1000" dirty="0" smtClean="0"/>
+              <a:t> - </a:t>
+            </a:r>
+            <a:r>
+              <a:rPr lang="en-GB" sz="1000" dirty="0" err="1" smtClean="0"/>
+              <a:t>Wiimote</a:t>
+            </a:r>
+            <a:r>
+              <a:rPr lang="en-GB" sz="1000" dirty="0" smtClean="0"/>
+              <a:t> Virtual Reality Desktop</a:t>
+            </a:r>
+          </a:p>
+          <a:p>
+            <a:r>
+              <a:rPr lang="en-GB" sz="1000" dirty="0" smtClean="0"/>
+              <a:t>    =&gt; </a:t>
+            </a:r>
+            <a:r>
+              <a:rPr lang="en-GB" sz="1000" dirty="0" err="1" smtClean="0"/>
+              <a:t>Wiimote</a:t>
+            </a:r>
+            <a:r>
+              <a:rPr lang="en-GB" sz="1000" dirty="0" smtClean="0"/>
+              <a:t> tracking with 4 LEDs</a:t>
+            </a:r>
+          </a:p>
+          <a:p>
+            <a:r>
+              <a:rPr lang="en-GB" sz="1000" dirty="0" smtClean="0"/>
+              <a:t>    https://channel9.msdn.com/coding4fun/articles/Wiimote-Virtual-Reality-Desktop</a:t>
+            </a:r>
+          </a:p>
+          <a:p>
+            <a:r>
+              <a:rPr lang="en-GB" sz="1000" dirty="0" smtClean="0"/>
+              <a:t>    http://www.vrhome.de/downloads</a:t>
+            </a:r>
+          </a:p>
+          <a:p>
+            <a:r>
+              <a:rPr lang="en-GB" sz="1000" dirty="0" smtClean="0"/>
+              <a:t>  - </a:t>
+            </a:r>
+            <a:r>
+              <a:rPr lang="en-GB" sz="1000" dirty="0" err="1" smtClean="0"/>
+              <a:t>Wii</a:t>
+            </a:r>
+            <a:r>
+              <a:rPr lang="en-GB" sz="1000" dirty="0" smtClean="0"/>
+              <a:t> Remote Tracking:</a:t>
+            </a:r>
+          </a:p>
+          <a:p>
+            <a:r>
+              <a:rPr lang="en-GB" sz="1000" dirty="0" smtClean="0"/>
+              <a:t>    From:</a:t>
+            </a:r>
+          </a:p>
+          <a:p>
+            <a:r>
+              <a:rPr lang="en-GB" sz="1000" dirty="0" smtClean="0"/>
+              <a:t>    http://idav.ucdavis.edu/~okreylos/ResDev/Wiimote/MainPage.html</a:t>
+            </a:r>
+          </a:p>
+          <a:p>
+            <a:r>
+              <a:rPr lang="en-GB" sz="1000" dirty="0" smtClean="0"/>
+              <a:t>    - Technology:</a:t>
+            </a:r>
+          </a:p>
+          <a:p>
+            <a:r>
+              <a:rPr lang="en-GB" sz="1000" dirty="0" smtClean="0"/>
+              <a:t>      =&gt; Maths.</a:t>
+            </a:r>
+          </a:p>
+          <a:p>
+            <a:r>
+              <a:rPr lang="en-GB" sz="1000" dirty="0" smtClean="0"/>
+              <a:t>      http://idav.ucdavis.edu/~okreylos/ResDev/Wiimote/Technology.html</a:t>
+            </a:r>
+          </a:p>
+          <a:p>
+            <a:r>
+              <a:rPr lang="en-GB" sz="1000" dirty="0" smtClean="0"/>
+              <a:t>    - IR Tracker Beacon:</a:t>
+            </a:r>
+          </a:p>
+          <a:p>
+            <a:r>
+              <a:rPr lang="en-GB" sz="1000" dirty="0" smtClean="0"/>
+              <a:t>      =&gt; Homemade sensor bar.</a:t>
+            </a:r>
+          </a:p>
+          <a:p>
+            <a:r>
+              <a:rPr lang="en-GB" sz="1000" dirty="0" smtClean="0"/>
+              <a:t>      http://idav.ucdavis.edu/~okreylos/ResDev/Wiimote/IRBeacon.html</a:t>
+            </a:r>
+          </a:p>
+          <a:p>
+            <a:r>
+              <a:rPr lang="en-GB" sz="1000" dirty="0" smtClean="0"/>
+              <a:t>!</a:t>
+            </a:r>
+          </a:p>
+          <a:p>
+            <a:r>
+              <a:rPr lang="en-GB" sz="1000" dirty="0" smtClean="0"/>
+              <a:t>OR:</a:t>
+            </a:r>
+          </a:p>
+          <a:p>
+            <a:r>
+              <a:rPr lang="en-GB" sz="1000" dirty="0" smtClean="0"/>
+              <a:t>!- Using the sensor bar, can determine the yaw (&amp; combine with the rest!)</a:t>
+            </a:r>
+          </a:p>
+          <a:p>
+            <a:r>
+              <a:rPr lang="en-GB" sz="1000" dirty="0" smtClean="0"/>
+              <a:t>  BUT: limited to 40°!</a:t>
+            </a:r>
+          </a:p>
+          <a:p>
+            <a:r>
+              <a:rPr lang="en-GB" sz="1000" dirty="0" smtClean="0"/>
+              <a:t>  =&gt; Use multiple bars...</a:t>
+            </a:r>
+          </a:p>
+          <a:p>
+            <a:r>
+              <a:rPr lang="en-GB" sz="1000" dirty="0" smtClean="0"/>
+              <a:t>    https://www.dailymotion.com/video/xu7i0f</a:t>
+            </a:r>
+          </a:p>
+          <a:p>
+            <a:r>
+              <a:rPr lang="en-GB" sz="1000" dirty="0" smtClean="0"/>
+              <a:t>    (look at PDFs)</a:t>
+            </a:r>
+          </a:p>
+          <a:p>
+            <a:endParaRPr lang="en-GB" sz="1000" dirty="0" smtClean="0"/>
+          </a:p>
+          <a:p>
+            <a:r>
+              <a:rPr lang="en-GB" sz="1000" dirty="0" smtClean="0"/>
+              <a:t>OR:</a:t>
+            </a:r>
+          </a:p>
+          <a:p>
+            <a:r>
+              <a:rPr lang="en-GB" sz="1000" dirty="0" smtClean="0"/>
+              <a:t>- Can also have data from gyroscopes (preferably with </a:t>
+            </a:r>
+            <a:r>
+              <a:rPr lang="en-GB" sz="1000" dirty="0" err="1" smtClean="0"/>
+              <a:t>Wii</a:t>
+            </a:r>
+            <a:r>
+              <a:rPr lang="en-GB" sz="1000" dirty="0" smtClean="0"/>
+              <a:t> Motion Plus </a:t>
+            </a:r>
+            <a:r>
+              <a:rPr lang="en-GB" sz="1000" dirty="0" err="1" smtClean="0"/>
+              <a:t>addon</a:t>
+            </a:r>
+            <a:r>
+              <a:rPr lang="en-GB" sz="1000" dirty="0" smtClean="0"/>
+              <a:t>)</a:t>
+            </a:r>
+          </a:p>
+          <a:p>
+            <a:endParaRPr lang="en-GB" sz="1000" dirty="0" smtClean="0"/>
+          </a:p>
+        </p:txBody>
+      </p:sp>
+      <p:sp>
+        <p:nvSpPr>
+          <p:cNvPr id="18" name="ZoneTexte 17"/>
+          <p:cNvSpPr txBox="1"/>
+          <p:nvPr/>
+        </p:nvSpPr>
+        <p:spPr>
+          <a:xfrm>
+            <a:off x="323528" y="260648"/>
+            <a:ext cx="2077235" cy="461665"/>
+          </a:xfrm>
+          <a:prstGeom prst="rect">
+            <a:avLst/>
+          </a:prstGeom>
+          <a:noFill/>
+        </p:spPr>
+        <p:txBody>
+          <a:bodyPr wrap="none" rtlCol="0">
+            <a:spAutoFit/>
+          </a:bodyPr>
+          <a:lstStyle/>
+          <a:p>
+            <a:r>
+              <a:rPr lang="en-GB" sz="2400" b="1" dirty="0" smtClean="0"/>
+              <a:t>CLIENT – HEAD</a:t>
+            </a:r>
+          </a:p>
+        </p:txBody>
+      </p:sp>
+      <p:sp>
+        <p:nvSpPr>
+          <p:cNvPr id="13" name="ZoneTexte 12"/>
+          <p:cNvSpPr txBox="1"/>
+          <p:nvPr/>
+        </p:nvSpPr>
+        <p:spPr>
+          <a:xfrm>
+            <a:off x="3491880" y="404664"/>
+            <a:ext cx="1885196" cy="461665"/>
+          </a:xfrm>
+          <a:prstGeom prst="rect">
+            <a:avLst/>
+          </a:prstGeom>
+          <a:noFill/>
+        </p:spPr>
+        <p:txBody>
+          <a:bodyPr wrap="none" rtlCol="0">
+            <a:spAutoFit/>
+          </a:bodyPr>
+          <a:lstStyle/>
+          <a:p>
+            <a:r>
+              <a:rPr lang="en-GB" sz="2400" b="1" dirty="0" smtClean="0">
+                <a:solidFill>
+                  <a:srgbClr val="FF0000"/>
+                </a:solidFill>
+              </a:rPr>
+              <a:t>!!!! TODO !!!!</a:t>
+            </a:r>
+          </a:p>
+        </p:txBody>
+      </p:sp>
+      <p:sp>
+        <p:nvSpPr>
+          <p:cNvPr id="5" name="ZoneTexte 4"/>
+          <p:cNvSpPr txBox="1"/>
+          <p:nvPr/>
+        </p:nvSpPr>
+        <p:spPr>
+          <a:xfrm>
+            <a:off x="5796136" y="4869160"/>
+            <a:ext cx="2973699" cy="1384995"/>
+          </a:xfrm>
+          <a:prstGeom prst="rect">
+            <a:avLst/>
+          </a:prstGeom>
+          <a:noFill/>
+        </p:spPr>
+        <p:txBody>
+          <a:bodyPr wrap="none" rtlCol="0">
+            <a:spAutoFit/>
+          </a:bodyPr>
+          <a:lstStyle/>
+          <a:p>
+            <a:r>
+              <a:rPr lang="en-GB" sz="1200" dirty="0" smtClean="0"/>
+              <a:t>LIBRARIES</a:t>
+            </a:r>
+            <a:r>
+              <a:rPr lang="en-GB" sz="1200" dirty="0" smtClean="0"/>
+              <a:t>:</a:t>
+            </a:r>
+          </a:p>
+          <a:p>
+            <a:endParaRPr lang="en-GB" sz="1200" dirty="0" smtClean="0"/>
+          </a:p>
+          <a:p>
+            <a:r>
+              <a:rPr lang="en-GB" sz="1200" dirty="0" smtClean="0"/>
+              <a:t>- Unity </a:t>
+            </a:r>
+            <a:r>
+              <a:rPr lang="en-GB" sz="1200" dirty="0" err="1" smtClean="0"/>
+              <a:t>Wiimote</a:t>
+            </a:r>
+            <a:r>
+              <a:rPr lang="en-GB" sz="1200" dirty="0" smtClean="0"/>
+              <a:t> API:</a:t>
+            </a:r>
+          </a:p>
+          <a:p>
+            <a:r>
+              <a:rPr lang="en-GB" sz="1200" dirty="0" smtClean="0"/>
+              <a:t>  https://github.com/Flafla2/Unity-Wiimote</a:t>
+            </a:r>
+          </a:p>
+          <a:p>
+            <a:r>
+              <a:rPr lang="en-GB" sz="1200" dirty="0" smtClean="0"/>
+              <a:t>- </a:t>
+            </a:r>
+            <a:r>
+              <a:rPr lang="en-GB" sz="1200" dirty="0" err="1" smtClean="0"/>
+              <a:t>Wiimote</a:t>
+            </a:r>
+            <a:r>
+              <a:rPr lang="en-GB" sz="1200" dirty="0" smtClean="0"/>
+              <a:t> library:</a:t>
+            </a:r>
+          </a:p>
+          <a:p>
+            <a:r>
+              <a:rPr lang="en-GB" sz="1200" dirty="0" smtClean="0"/>
+              <a:t>    https://github.com/BrianPeek/WiimoteLib</a:t>
+            </a:r>
+          </a:p>
+          <a:p>
+            <a:endParaRPr lang="en-GB" sz="1200" dirty="0"/>
+          </a:p>
+        </p:txBody>
+      </p:sp>
+    </p:spTree>
+  </p:cSld>
+  <p:clrMapOvr>
+    <a:masterClrMapping/>
+  </p:clrMapOvr>
+  <p:timing>
+    <p:tnLst>
+      <p:par>
+        <p:cTn id="1" dur="indefinite" restart="never" nodeType="tmRoot"/>
+      </p:par>
+    </p:tnLst>
+  </p:timing>
+</p:sld>
+</file>
+
+<file path=ppt/slides/slide17.xml><?xml version="1.0" encoding="utf-8"?>
+<p:sld xmlns:a="http://schemas.openxmlformats.org/drawingml/2006/main" xmlns:r="http://schemas.openxmlformats.org/officeDocument/2006/relationships" xmlns:p="http://schemas.openxmlformats.org/presentationml/2006/main">
+  <p:cSld>
+    <p:spTree>
+      <p:nvGrpSpPr>
+        <p:cNvPr id="1" name=""/>
+        <p:cNvGrpSpPr/>
+        <p:nvPr/>
+      </p:nvGrpSpPr>
+      <p:grpSpPr>
+        <a:xfrm>
+          <a:off x="0" y="0"/>
+          <a:ext cx="0" cy="0"/>
+          <a:chOff x="0" y="0"/>
+          <a:chExt cx="0" cy="0"/>
+        </a:xfrm>
+      </p:grpSpPr>
+      <p:sp>
+        <p:nvSpPr>
+          <p:cNvPr id="17" name="ZoneTexte 16"/>
+          <p:cNvSpPr txBox="1"/>
+          <p:nvPr/>
+        </p:nvSpPr>
+        <p:spPr>
+          <a:xfrm>
+            <a:off x="899592" y="1052736"/>
+            <a:ext cx="6590587" cy="2308324"/>
+          </a:xfrm>
+          <a:prstGeom prst="rect">
+            <a:avLst/>
+          </a:prstGeom>
+          <a:noFill/>
+        </p:spPr>
+        <p:txBody>
+          <a:bodyPr wrap="none" rtlCol="0">
+            <a:spAutoFit/>
+          </a:bodyPr>
+          <a:lstStyle/>
+          <a:p>
+            <a:r>
+              <a:rPr lang="en-GB" dirty="0" smtClean="0"/>
+              <a:t>...</a:t>
+            </a:r>
+            <a:endParaRPr lang="en-GB" smtClean="0"/>
+          </a:p>
+          <a:p>
+            <a:endParaRPr lang="en-GB" dirty="0" smtClean="0"/>
+          </a:p>
+          <a:p>
+            <a:pPr>
+              <a:buFontTx/>
+              <a:buChar char="-"/>
+            </a:pPr>
+            <a:r>
+              <a:rPr lang="en-GB" dirty="0" smtClean="0"/>
+              <a:t> Hand tracking</a:t>
+            </a:r>
+          </a:p>
+          <a:p>
+            <a:pPr lvl="1"/>
+            <a:r>
+              <a:rPr lang="en-GB" dirty="0" smtClean="0"/>
+              <a:t>=&gt; Using </a:t>
+            </a:r>
+            <a:r>
+              <a:rPr lang="en-GB" dirty="0" err="1" smtClean="0"/>
+              <a:t>Kinect</a:t>
+            </a:r>
+            <a:r>
+              <a:rPr lang="en-GB" dirty="0" smtClean="0"/>
+              <a:t> body frames</a:t>
+            </a:r>
+          </a:p>
+          <a:p>
+            <a:pPr lvl="1"/>
+            <a:r>
+              <a:rPr lang="en-GB" dirty="0" smtClean="0"/>
+              <a:t>! – Tracking struggle when hands in front of body!</a:t>
+            </a:r>
+          </a:p>
+          <a:p>
+            <a:endParaRPr lang="en-GB" dirty="0" smtClean="0"/>
+          </a:p>
+          <a:p>
+            <a:pPr>
+              <a:buFontTx/>
+              <a:buChar char="-"/>
+            </a:pPr>
+            <a:r>
+              <a:rPr lang="en-GB" dirty="0" smtClean="0"/>
+              <a:t> Could hold coloured devices to allow different types of interactions</a:t>
+            </a:r>
+          </a:p>
+          <a:p>
+            <a:pPr lvl="1"/>
+            <a:r>
+              <a:rPr lang="en-GB" dirty="0" smtClean="0"/>
+              <a:t>=&gt; Colour tracking with </a:t>
+            </a:r>
+            <a:r>
+              <a:rPr lang="en-GB" dirty="0" err="1" smtClean="0"/>
+              <a:t>Kinect</a:t>
+            </a:r>
+            <a:r>
+              <a:rPr lang="en-GB" dirty="0" smtClean="0"/>
+              <a:t> RGB image (using </a:t>
+            </a:r>
+            <a:r>
+              <a:rPr lang="en-GB" dirty="0" err="1" smtClean="0"/>
+              <a:t>OpenCV</a:t>
+            </a:r>
+            <a:r>
+              <a:rPr lang="en-GB" dirty="0" smtClean="0"/>
+              <a:t>?)</a:t>
+            </a:r>
+          </a:p>
+        </p:txBody>
+      </p:sp>
+      <p:sp>
+        <p:nvSpPr>
+          <p:cNvPr id="18" name="ZoneTexte 17"/>
+          <p:cNvSpPr txBox="1"/>
+          <p:nvPr/>
+        </p:nvSpPr>
+        <p:spPr>
+          <a:xfrm>
+            <a:off x="323528" y="260648"/>
+            <a:ext cx="2278188" cy="461665"/>
+          </a:xfrm>
+          <a:prstGeom prst="rect">
+            <a:avLst/>
+          </a:prstGeom>
+          <a:noFill/>
+        </p:spPr>
+        <p:txBody>
+          <a:bodyPr wrap="none" rtlCol="0">
+            <a:spAutoFit/>
+          </a:bodyPr>
+          <a:lstStyle/>
+          <a:p>
+            <a:r>
+              <a:rPr lang="en-GB" sz="2400" b="1" dirty="0" smtClean="0"/>
+              <a:t>CLIENT – HANDS</a:t>
+            </a:r>
+          </a:p>
+        </p:txBody>
+      </p:sp>
+      <p:sp>
+        <p:nvSpPr>
+          <p:cNvPr id="4" name="ZoneTexte 3"/>
+          <p:cNvSpPr txBox="1"/>
+          <p:nvPr/>
+        </p:nvSpPr>
+        <p:spPr>
+          <a:xfrm>
+            <a:off x="3491880" y="404664"/>
+            <a:ext cx="1885196" cy="461665"/>
+          </a:xfrm>
+          <a:prstGeom prst="rect">
+            <a:avLst/>
+          </a:prstGeom>
+          <a:noFill/>
+        </p:spPr>
+        <p:txBody>
+          <a:bodyPr wrap="none" rtlCol="0">
+            <a:spAutoFit/>
+          </a:bodyPr>
+          <a:lstStyle/>
+          <a:p>
+            <a:r>
+              <a:rPr lang="en-GB" sz="2400" b="1" dirty="0" smtClean="0">
+                <a:solidFill>
+                  <a:srgbClr val="FF0000"/>
+                </a:solidFill>
+              </a:rPr>
+              <a:t>!!!! TODO !!!!</a:t>
+            </a:r>
           </a:p>
         </p:txBody>
       </p:sp>
@@ -3913,11 +5745,7 @@
             </a:r>
             <a:r>
               <a:rPr lang="en-GB" sz="1400" dirty="0" smtClean="0"/>
-              <a:t> </a:t>
-            </a:r>
-            <a:r>
-              <a:rPr lang="en-GB" sz="1400" dirty="0" smtClean="0"/>
-              <a:t>interface</a:t>
+              <a:t> interface</a:t>
             </a:r>
           </a:p>
           <a:p>
@@ -3933,7 +5761,6 @@
               <a:rPr lang="en-GB" sz="1400" b="1" u="sng" dirty="0" smtClean="0"/>
               <a:t>Tracking module</a:t>
             </a:r>
-            <a:endParaRPr lang="en-GB" sz="1400" b="1" u="sng" dirty="0" smtClean="0"/>
           </a:p>
         </p:txBody>
       </p:sp>
@@ -5009,11 +6836,7 @@
             </a:pPr>
             <a:r>
               <a:rPr lang="en-GB" sz="1600" dirty="0" smtClean="0"/>
-              <a:t> Detect </a:t>
-            </a:r>
-            <a:r>
-              <a:rPr lang="en-GB" sz="1600" dirty="0" smtClean="0"/>
-              <a:t>“collisions”</a:t>
+              <a:t> Detect “collisions”</a:t>
             </a:r>
           </a:p>
           <a:p>
@@ -5083,11 +6906,7 @@
             </a:r>
             <a:r>
               <a:rPr lang="en-GB" sz="1600" i="1" dirty="0" smtClean="0"/>
-              <a:t> </a:t>
-            </a:r>
-            <a:r>
-              <a:rPr lang="en-GB" sz="1600" i="1" dirty="0" smtClean="0"/>
-              <a:t>Head</a:t>
+              <a:t> Head</a:t>
             </a:r>
           </a:p>
           <a:p>
@@ -5174,13 +6993,8 @@
             </a:r>
             <a:r>
               <a:rPr lang="en-GB" sz="1600" dirty="0" smtClean="0"/>
-              <a:t>Relevant game </a:t>
-            </a:r>
-            <a:r>
-              <a:rPr lang="en-GB" sz="1600" dirty="0" smtClean="0"/>
-              <a:t>data</a:t>
-            </a:r>
-            <a:endParaRPr lang="en-GB" sz="1600" dirty="0" smtClean="0"/>
+              <a:t>Relevant game data</a:t>
+            </a:r>
           </a:p>
         </p:txBody>
       </p:sp>
@@ -5552,11 +7366,7 @@
             </a:r>
             <a:r>
               <a:rPr lang="en-GB" sz="1400" dirty="0" smtClean="0"/>
-              <a:t> </a:t>
-            </a:r>
-            <a:r>
-              <a:rPr lang="en-GB" sz="1400" dirty="0" smtClean="0"/>
-              <a:t>interface</a:t>
+              <a:t> interface</a:t>
             </a:r>
           </a:p>
           <a:p>
@@ -6109,11 +7919,7 @@
             </a:pPr>
             <a:r>
               <a:rPr lang="en-GB" sz="1400" dirty="0" smtClean="0"/>
-              <a:t> </a:t>
-            </a:r>
-            <a:r>
-              <a:rPr lang="en-GB" sz="1400" dirty="0" smtClean="0"/>
-              <a:t>(Orientation manager)</a:t>
+              <a:t> (Orientation manager)</a:t>
             </a:r>
             <a:endParaRPr lang="en-GB" sz="1400" dirty="0"/>
           </a:p>
@@ -6528,11 +8334,7 @@
             </a:pPr>
             <a:r>
               <a:rPr lang="en-GB" sz="1400" dirty="0" smtClean="0"/>
-              <a:t> </a:t>
-            </a:r>
-            <a:r>
-              <a:rPr lang="en-GB" sz="1400" dirty="0" smtClean="0"/>
-              <a:t>Camera</a:t>
+              <a:t> Camera</a:t>
             </a:r>
           </a:p>
           <a:p>
@@ -6541,7 +8343,6 @@
               <a:rPr lang="en-GB" sz="1400" dirty="0" smtClean="0"/>
               <a:t>=&gt; Display only</a:t>
             </a:r>
-            <a:endParaRPr lang="en-GB" sz="1400" dirty="0" smtClean="0"/>
           </a:p>
           <a:p>
             <a:pPr>
@@ -6633,15 +8434,7 @@
             </a:pPr>
             <a:r>
               <a:rPr lang="en-GB" sz="1400" dirty="0" smtClean="0"/>
-              <a:t> </a:t>
-            </a:r>
-            <a:r>
-              <a:rPr lang="en-GB" sz="1400" dirty="0" smtClean="0"/>
-              <a:t>Position </a:t>
-            </a:r>
-            <a:r>
-              <a:rPr lang="en-GB" sz="1400" dirty="0" smtClean="0"/>
-              <a:t>of </a:t>
+              <a:t> Position of </a:t>
             </a:r>
             <a:r>
               <a:rPr lang="en-GB" sz="1400" i="1" dirty="0" smtClean="0"/>
@@ -6722,11 +8515,7 @@
             </a:pPr>
             <a:r>
               <a:rPr lang="en-GB" sz="1400" dirty="0" smtClean="0"/>
-              <a:t> Update </a:t>
-            </a:r>
-            <a:r>
-              <a:rPr lang="en-GB" sz="1400" dirty="0" smtClean="0"/>
-              <a:t>orientation</a:t>
+              <a:t> Update orientation</a:t>
             </a:r>
           </a:p>
           <a:p>
@@ -6742,7 +8531,6 @@
               <a:rPr lang="en-GB" sz="1400" dirty="0" smtClean="0"/>
               <a:t>	gyroscope data</a:t>
             </a:r>
-            <a:endParaRPr lang="en-GB" sz="1400" dirty="0" smtClean="0"/>
           </a:p>
           <a:p>
             <a:pPr lvl="1">
@@ -7553,11 +9341,7 @@
             </a:r>
             <a:r>
               <a:rPr lang="en-GB" strike="sngStrike" dirty="0" smtClean="0"/>
-              <a:t>Provided by gyroscope (Android API</a:t>
-            </a:r>
-            <a:r>
-              <a:rPr lang="en-GB" strike="sngStrike" dirty="0" smtClean="0"/>
-              <a:t>)</a:t>
+              <a:t>Provided by gyroscope (Android API)</a:t>
             </a:r>
             <a:endParaRPr lang="en-GB" dirty="0" smtClean="0"/>
           </a:p>
@@ -7614,11 +9398,6 @@
               </a:rPr>
               <a:t> RGB images</a:t>
             </a:r>
-            <a:endParaRPr lang="en-GB" b="1" dirty="0" smtClean="0">
-              <a:solidFill>
-                <a:srgbClr val="FF0000"/>
-              </a:solidFill>
-            </a:endParaRPr>
           </a:p>
           <a:p>
             <a:pPr lvl="1">
@@ -7627,21 +9406,8 @@
             </a:pPr>
             <a:r>
               <a:rPr lang="en-GB" dirty="0" smtClean="0"/>
-              <a:t> </a:t>
-            </a:r>
-            <a:r>
-              <a:rPr lang="en-GB" dirty="0" smtClean="0"/>
-              <a:t>In </a:t>
-            </a:r>
-            <a:r>
-              <a:rPr lang="en-GB" dirty="0" smtClean="0"/>
-              <a:t>scene: Need to be calibrated at </a:t>
-            </a:r>
-            <a:r>
-              <a:rPr lang="en-GB" dirty="0" smtClean="0"/>
-              <a:t>initialisation</a:t>
-            </a:r>
-            <a:endParaRPr lang="en-GB" dirty="0" smtClean="0"/>
+              <a:t> In scene: Need to be calibrated at initialisation</a:t>
+            </a:r>
           </a:p>
           <a:p>
             <a:pPr lvl="1"/>
@@ -7673,11 +9439,6 @@
               </a:rPr>
               <a:t> orientation</a:t>
             </a:r>
-            <a:endParaRPr lang="en-GB" dirty="0" smtClean="0">
-              <a:solidFill>
-                <a:srgbClr val="FF0000"/>
-              </a:solidFill>
-            </a:endParaRPr>
           </a:p>
           <a:p>
             <a:pPr lvl="1"/>
@@ -8367,23 +10128,14 @@
           <a:p>
             <a:r>
               <a:rPr lang="en-GB" b="1" u="sng" dirty="0" smtClean="0"/>
-              <a:t>Orientation </a:t>
-            </a:r>
-            <a:r>
-              <a:rPr lang="en-GB" b="1" u="sng" dirty="0" smtClean="0"/>
-              <a:t>determination:</a:t>
-            </a:r>
-            <a:endParaRPr lang="en-GB" b="1" u="sng" dirty="0" smtClean="0"/>
+              <a:t>Orientation determination:</a:t>
+            </a:r>
           </a:p>
           <a:p>
             <a:pPr lvl="1"/>
             <a:r>
               <a:rPr lang="en-GB" dirty="0" smtClean="0"/>
-              <a:t>=&gt; </a:t>
-            </a:r>
-            <a:r>
-              <a:rPr lang="en-GB" dirty="0" smtClean="0"/>
-              <a:t>Using </a:t>
+              <a:t>=&gt; Using </a:t>
             </a:r>
             <a:r>
               <a:rPr lang="en-GB" dirty="0" err="1" smtClean="0"/>
@@ -8393,7 +10145,6 @@
               <a:rPr lang="en-GB" dirty="0" smtClean="0"/>
               <a:t> RGB video feed to determine head orientation</a:t>
             </a:r>
-            <a:endParaRPr lang="en-GB" dirty="0" smtClean="0"/>
           </a:p>
           <a:p>
             <a:pPr lvl="1">
@@ -8402,13 +10153,8 @@
             </a:pPr>
             <a:r>
               <a:rPr lang="en-GB" dirty="0" smtClean="0"/>
-              <a:t> </a:t>
-            </a:r>
-            <a:r>
-              <a:rPr lang="en-GB" dirty="0" smtClean="0"/>
-              <a:t>YAW</a:t>
-            </a:r>
-            <a:endParaRPr lang="en-GB" dirty="0" smtClean="0"/>
+              <a:t> YAW</a:t>
+            </a:r>
           </a:p>
           <a:p>
             <a:pPr lvl="1">
@@ -8417,11 +10163,7 @@
             </a:pPr>
             <a:r>
               <a:rPr lang="en-GB" dirty="0" smtClean="0"/>
-              <a:t> </a:t>
-            </a:r>
-            <a:r>
-              <a:rPr lang="en-GB" dirty="0" smtClean="0"/>
-              <a:t>PITCH</a:t>
+              <a:t> PITCH</a:t>
             </a:r>
           </a:p>
           <a:p>
@@ -8431,13 +10173,8 @@
             </a:pPr>
             <a:r>
               <a:rPr lang="en-GB" dirty="0" smtClean="0"/>
-              <a:t> </a:t>
-            </a:r>
-            <a:r>
-              <a:rPr lang="en-GB" dirty="0" smtClean="0"/>
-              <a:t>ROLL</a:t>
-            </a:r>
-            <a:endParaRPr lang="en-GB" dirty="0" smtClean="0"/>
+              <a:t> ROLL</a:t>
+            </a:r>
           </a:p>
           <a:p>
             <a:endParaRPr lang="en-GB" dirty="0" smtClean="0"/>
@@ -8447,7 +10184,6 @@
               <a:rPr lang="en-GB" dirty="0" smtClean="0"/>
               <a:t>=&gt; PITCH &amp; ROLL can be combined/validated with gyroscope data</a:t>
             </a:r>
-            <a:endParaRPr lang="en-GB" dirty="0" smtClean="0"/>
           </a:p>
           <a:p>
             <a:pPr marL="0" lvl="1"/>
@@ -8473,23 +10209,7 @@
                   <a:srgbClr val="FF0000"/>
                 </a:solidFill>
               </a:rPr>
-              <a:t> </a:t>
-            </a:r>
-            <a:r>
-              <a:rPr lang="en-GB" dirty="0" smtClean="0">
-                <a:solidFill>
-                  <a:srgbClr val="FF0000"/>
-                </a:solidFill>
-              </a:rPr>
-              <a:t>must be properly aligned to </a:t>
-            </a:r>
-            <a:r>
-              <a:rPr lang="en-GB" dirty="0" smtClean="0">
-                <a:solidFill>
-                  <a:srgbClr val="FF0000"/>
-                </a:solidFill>
-              </a:rPr>
-              <a:t>world!</a:t>
+              <a:t> must be properly aligned to world!</a:t>
             </a:r>
             <a:endParaRPr lang="en-GB" dirty="0" smtClean="0"/>
           </a:p>

</xml_diff>

<commit_message>
Added tracking links and info
</commit_message>
<xml_diff>
--- a/docs/KINECT_AR_2.pptx
+++ b/docs/KINECT_AR_2.pptx
@@ -3625,11 +3625,7 @@
           <a:p>
             <a:r>
               <a:rPr lang="en-GB" dirty="0" smtClean="0"/>
-              <a:t>Requirements</a:t>
-            </a:r>
-            <a:r>
-              <a:rPr lang="en-GB" dirty="0" smtClean="0"/>
-              <a:t>:</a:t>
+              <a:t>Requirements:</a:t>
             </a:r>
           </a:p>
           <a:p>
@@ -3715,25 +3711,13 @@
             </a:r>
             <a:r>
               <a:rPr lang="en-GB" dirty="0" smtClean="0"/>
-              <a:t> </a:t>
-            </a:r>
+              <a:t> FOV</a:t>
+            </a:r>
+          </a:p>
+          <a:p>
             <a:r>
               <a:rPr lang="en-GB" dirty="0" smtClean="0"/>
-              <a:t>FOV</a:t>
-            </a:r>
-          </a:p>
-          <a:p>
-            <a:r>
-              <a:rPr lang="en-GB" dirty="0" smtClean="0"/>
-              <a:t>	</a:t>
-            </a:r>
-            <a:r>
-              <a:rPr lang="en-GB" dirty="0" smtClean="0"/>
-              <a:t>(shouldn't </a:t>
-            </a:r>
-            <a:r>
-              <a:rPr lang="en-GB" dirty="0" smtClean="0"/>
-              <a:t>anyway, as positioning will not work either)</a:t>
+              <a:t>	(shouldn't anyway, as positioning will not work either)</a:t>
             </a:r>
           </a:p>
           <a:p>
@@ -3870,43 +3854,81 @@
               <a:rPr lang="en-GB" sz="1400" dirty="0" smtClean="0"/>
               <a:t>LOOK AT:</a:t>
             </a:r>
+          </a:p>
+          <a:p>
+            <a:r>
+              <a:rPr lang="en-GB" sz="1400" dirty="0" smtClean="0"/>
+              <a:t>- Software:</a:t>
+            </a:r>
+          </a:p>
+          <a:p>
+            <a:r>
+              <a:rPr lang="en-GB" sz="1400" dirty="0" smtClean="0"/>
+              <a:t>    !? =&gt; LOOK AT:</a:t>
+            </a:r>
+          </a:p>
+          <a:p>
+            <a:r>
+              <a:rPr lang="en-GB" sz="1400" dirty="0" smtClean="0"/>
+              <a:t>      - AForge.NET (in C#):</a:t>
+            </a:r>
+          </a:p>
+          <a:p>
+            <a:r>
+              <a:rPr lang="en-GB" sz="1400" dirty="0" smtClean="0"/>
+              <a:t>        </a:t>
+            </a:r>
+            <a:r>
+              <a:rPr lang="en-GB" sz="1400" dirty="0" smtClean="0">
+                <a:hlinkClick r:id="rId2"/>
+              </a:rPr>
+              <a:t>http://</a:t>
+            </a:r>
+            <a:r>
+              <a:rPr lang="en-GB" sz="1400" dirty="0" smtClean="0">
+                <a:hlinkClick r:id="rId2"/>
+              </a:rPr>
+              <a:t>www.aforgenet.com</a:t>
+            </a:r>
             <a:endParaRPr lang="en-GB" sz="1400" dirty="0" smtClean="0"/>
           </a:p>
           <a:p>
             <a:r>
               <a:rPr lang="en-GB" sz="1400" dirty="0" smtClean="0"/>
-              <a:t>- Software:</a:t>
-            </a:r>
-          </a:p>
-          <a:p>
-            <a:r>
-              <a:rPr lang="en-GB" sz="1400" dirty="0" smtClean="0"/>
-              <a:t>    !? =&gt; LOOK AT:</a:t>
-            </a:r>
-          </a:p>
-          <a:p>
-            <a:r>
-              <a:rPr lang="en-GB" sz="1400" dirty="0" smtClean="0"/>
-              <a:t>      - AForge.NET (in C#):</a:t>
-            </a:r>
-          </a:p>
-          <a:p>
-            <a:r>
-              <a:rPr lang="en-GB" sz="1400" dirty="0" smtClean="0"/>
-              <a:t>        http://www.aforgenet.com/</a:t>
-            </a:r>
-          </a:p>
-          <a:p>
-            <a:r>
-              <a:rPr lang="en-GB" sz="1400" dirty="0" smtClean="0"/>
-              <a:t>        https://www.codeproject.com/Questions/738734/blob-detection-in-csharp</a:t>
-            </a:r>
-          </a:p>
-          <a:p>
-            <a:r>
-              <a:rPr lang="en-GB" sz="1400" dirty="0" smtClean="0"/>
-              <a:t>        http://www.emgu.com/forum/viewtopic.php?t=477</a:t>
-            </a:r>
+              <a:t>        </a:t>
+            </a:r>
+            <a:r>
+              <a:rPr lang="en-GB" sz="1400" dirty="0" smtClean="0">
+                <a:hlinkClick r:id="rId3"/>
+              </a:rPr>
+              <a:t>https://</a:t>
+            </a:r>
+            <a:r>
+              <a:rPr lang="en-GB" sz="1400" dirty="0" smtClean="0">
+                <a:hlinkClick r:id="rId3"/>
+              </a:rPr>
+              <a:t>www.codeproject.com/Questions/738734/blob-detection-in-csharp</a:t>
+            </a:r>
+            <a:endParaRPr lang="en-GB" sz="1400" dirty="0" smtClean="0"/>
+          </a:p>
+          <a:p>
+            <a:r>
+              <a:rPr lang="en-GB" sz="1400" dirty="0" smtClean="0"/>
+              <a:t>        </a:t>
+            </a:r>
+            <a:r>
+              <a:rPr lang="en-GB" sz="1400" dirty="0" smtClean="0">
+                <a:hlinkClick r:id="rId4"/>
+              </a:rPr>
+              <a:t>http://</a:t>
+            </a:r>
+            <a:r>
+              <a:rPr lang="en-GB" sz="1400" dirty="0" smtClean="0">
+                <a:hlinkClick r:id="rId4"/>
+              </a:rPr>
+              <a:t>www.emgu.com/forum/viewtopic.php?t=477</a:t>
+            </a:r>
+            <a:endParaRPr lang="en-GB" sz="1400" dirty="0" smtClean="0"/>
           </a:p>
           <a:p>
             <a:endParaRPr lang="en-GB" sz="1400" dirty="0" smtClean="0"/>
@@ -3976,13 +3998,30 @@
           <a:p>
             <a:r>
               <a:rPr lang="en-GB" sz="1400" dirty="0" smtClean="0"/>
-              <a:t>            https://assetstore.unity.com/packages/tools/integration/opencv-for-unity-21088</a:t>
-            </a:r>
-          </a:p>
-          <a:p>
-            <a:r>
-              <a:rPr lang="en-GB" sz="1400" dirty="0" smtClean="0"/>
-              <a:t>            ! - BUT: Not free!</a:t>
+              <a:t>            </a:t>
+            </a:r>
+            <a:r>
+              <a:rPr lang="en-GB" sz="1400" dirty="0" smtClean="0">
+                <a:hlinkClick r:id="rId5"/>
+              </a:rPr>
+              <a:t>https://</a:t>
+            </a:r>
+            <a:r>
+              <a:rPr lang="en-GB" sz="1400" dirty="0" smtClean="0">
+                <a:hlinkClick r:id="rId5"/>
+              </a:rPr>
+              <a:t>assetstore.unity.com/packages/tools/integration/opencv-for-unity-21088</a:t>
+            </a:r>
+            <a:endParaRPr lang="en-GB" sz="1400" dirty="0" smtClean="0"/>
+          </a:p>
+          <a:p>
+            <a:r>
+              <a:rPr lang="en-GB" sz="1400" dirty="0" smtClean="0"/>
+              <a:t>            </a:t>
+            </a:r>
+            <a:r>
+              <a:rPr lang="en-GB" sz="1400" dirty="0" smtClean="0"/>
+              <a:t>! - BUT: Not free!</a:t>
             </a:r>
           </a:p>
           <a:p>
@@ -4002,25 +4041,49 @@
           <a:p>
             <a:r>
               <a:rPr lang="en-GB" sz="1400" dirty="0" smtClean="0"/>
-              <a:t>            http://amin-ahmadi.com/2017/05/24/how-to-use-opencv-in-unity-example-project/</a:t>
-            </a:r>
-          </a:p>
-          <a:p>
-            <a:r>
-              <a:rPr lang="en-GB" sz="1400" dirty="0" smtClean="0"/>
-              <a:t>            https://thomasmountainborn.com/2016/09/11/unity-and-opencv-part-one-install/</a:t>
-            </a:r>
-          </a:p>
-          <a:p>
-            <a:r>
-              <a:rPr lang="en-GB" sz="1400" dirty="0" smtClean="0"/>
-              <a:t>            https://www.raywenderlich.com/5475-introduction-to-using-opencv-with-unity</a:t>
-            </a:r>
-          </a:p>
-          <a:p>
-            <a:r>
-              <a:rPr lang="en-GB" sz="1400" dirty="0" smtClean="0"/>
-              <a:t>      Others:</a:t>
+              <a:t>            </a:t>
+            </a:r>
+            <a:r>
+              <a:rPr lang="en-GB" sz="1400" dirty="0" smtClean="0">
+                <a:hlinkClick r:id="rId6"/>
+              </a:rPr>
+              <a:t>http://amin-ahmadi.com/2017/05/24/how-to-use-opencv-in-unity-example-project</a:t>
+            </a:r>
+            <a:r>
+              <a:rPr lang="en-GB" sz="1400" dirty="0" smtClean="0">
+                <a:hlinkClick r:id="rId6"/>
+              </a:rPr>
+              <a:t>/</a:t>
+            </a:r>
+            <a:endParaRPr lang="en-GB" sz="1400" dirty="0" smtClean="0"/>
+          </a:p>
+          <a:p>
+            <a:r>
+              <a:rPr lang="en-GB" sz="1400" dirty="0" smtClean="0"/>
+              <a:t>            </a:t>
+            </a:r>
+            <a:r>
+              <a:rPr lang="en-GB" sz="1400" dirty="0" smtClean="0">
+                <a:hlinkClick r:id="rId7"/>
+              </a:rPr>
+              <a:t>https://thomasmountainborn.com/2016/09/11/unity-and-opencv-part-one-install</a:t>
+            </a:r>
+            <a:r>
+              <a:rPr lang="en-GB" sz="1400" dirty="0" smtClean="0">
+                <a:hlinkClick r:id="rId7"/>
+              </a:rPr>
+              <a:t>/</a:t>
+            </a:r>
+            <a:endParaRPr lang="en-GB" sz="1400" dirty="0" smtClean="0"/>
+          </a:p>
+          <a:p>
+            <a:r>
+              <a:rPr lang="en-GB" sz="1400" dirty="0" smtClean="0"/>
+              <a:t>Others</a:t>
+            </a:r>
+            <a:r>
+              <a:rPr lang="en-GB" sz="1400" dirty="0" smtClean="0"/>
+              <a:t>:</a:t>
             </a:r>
           </a:p>
           <a:p>
@@ -4040,13 +4103,55 @@
           <a:p>
             <a:r>
               <a:rPr lang="en-GB" sz="1400" dirty="0" smtClean="0"/>
-              <a:t>        https://github.com/hasanavi/OpenCV-Unity3D-Object-Tracking</a:t>
-            </a:r>
-          </a:p>
-          <a:p>
-            <a:r>
-              <a:rPr lang="en-GB" sz="1400" dirty="0" smtClean="0"/>
-              <a:t>        =&gt; Not ideal, as </a:t>
+              <a:t>        </a:t>
+            </a:r>
+            <a:r>
+              <a:rPr lang="en-GB" sz="1400" dirty="0" smtClean="0">
+                <a:hlinkClick r:id="rId8"/>
+              </a:rPr>
+              <a:t>https://</a:t>
+            </a:r>
+            <a:r>
+              <a:rPr lang="en-GB" sz="1400" dirty="0" smtClean="0">
+                <a:hlinkClick r:id="rId8"/>
+              </a:rPr>
+              <a:t>github.com/hasanavi/OpenCV-Unity3D-Object-Tracking</a:t>
+            </a:r>
+            <a:endParaRPr lang="en-GB" sz="1400" dirty="0" smtClean="0"/>
+          </a:p>
+          <a:p>
+            <a:r>
+              <a:rPr lang="en-GB" sz="1400" dirty="0" smtClean="0"/>
+              <a:t>        </a:t>
+            </a:r>
+            <a:r>
+              <a:rPr lang="en-GB" sz="1400" dirty="0" smtClean="0">
+                <a:hlinkClick r:id="rId9"/>
+              </a:rPr>
+              <a:t>https</a:t>
+            </a:r>
+            <a:r>
+              <a:rPr lang="en-GB" sz="1400" dirty="0" smtClean="0">
+                <a:hlinkClick r:id="rId9"/>
+              </a:rPr>
+              <a:t>://</a:t>
+            </a:r>
+            <a:r>
+              <a:rPr lang="en-GB" sz="1400" dirty="0" smtClean="0">
+                <a:hlinkClick r:id="rId9"/>
+              </a:rPr>
+              <a:t>www.raywenderlich.com/5475-introduction-to-using-opencv-with-unity</a:t>
+            </a:r>
+            <a:endParaRPr lang="en-GB" sz="1400" dirty="0" smtClean="0"/>
+          </a:p>
+          <a:p>
+            <a:r>
+              <a:rPr lang="en-GB" sz="1400" dirty="0" smtClean="0"/>
+              <a:t>        </a:t>
+            </a:r>
+            <a:r>
+              <a:rPr lang="en-GB" sz="1400" dirty="0" smtClean="0"/>
+              <a:t>=&gt; Not ideal, as </a:t>
             </a:r>
             <a:r>
               <a:rPr lang="en-GB" sz="1400" dirty="0" err="1" smtClean="0"/>
@@ -4054,13 +4159,8 @@
             </a:r>
             <a:r>
               <a:rPr lang="en-GB" sz="1400" dirty="0" smtClean="0"/>
-              <a:t> already integrated in Unity</a:t>
-            </a:r>
-            <a:r>
-              <a:rPr lang="en-GB" sz="1400" dirty="0" smtClean="0"/>
-              <a:t>.</a:t>
-            </a:r>
-            <a:endParaRPr lang="en-GB" sz="1400" dirty="0" smtClean="0"/>
+              <a:t> already integrated in Unity.</a:t>
+            </a:r>
           </a:p>
         </p:txBody>
       </p:sp>
@@ -4202,11 +4302,7 @@
             </a:r>
             <a:r>
               <a:rPr lang="en-GB" sz="1400" dirty="0" smtClean="0"/>
-              <a:t> Colour </a:t>
-            </a:r>
-            <a:r>
-              <a:rPr lang="en-GB" sz="1400" dirty="0" smtClean="0"/>
-              <a:t>tracking:</a:t>
+              <a:t> Colour tracking:</a:t>
             </a:r>
           </a:p>
           <a:p>
@@ -4232,13 +4328,7 @@
               <a:rPr lang="en-GB" sz="1000" dirty="0" smtClean="0">
                 <a:hlinkClick r:id="rId2"/>
               </a:rPr>
-              <a:t>https://</a:t>
-            </a:r>
-            <a:r>
-              <a:rPr lang="en-GB" sz="1000" dirty="0" smtClean="0">
-                <a:hlinkClick r:id="rId2"/>
-              </a:rPr>
-              <a:t>www.mathworks.com/matlabcentral/fileexchange/40154-how-to-detect-and-track-red-green-and-blue-colored-object-in-live-video</a:t>
+              <a:t>https://www.mathworks.com/matlabcentral/fileexchange/40154-how-to-detect-and-track-red-green-and-blue-colored-object-in-live-video</a:t>
             </a:r>
             <a:endParaRPr lang="en-GB" sz="1000" dirty="0" smtClean="0"/>
           </a:p>
@@ -4599,11 +4689,7 @@
           <a:p>
             <a:r>
               <a:rPr lang="en-GB" sz="1400" dirty="0" smtClean="0"/>
-              <a:t>- </a:t>
-            </a:r>
-            <a:r>
-              <a:rPr lang="en-GB" sz="1400" dirty="0" smtClean="0"/>
-              <a:t>Tracking using </a:t>
+              <a:t>- Tracking using </a:t>
             </a:r>
             <a:r>
               <a:rPr lang="en-GB" sz="1400" dirty="0" err="1" smtClean="0"/>
@@ -4657,11 +4743,7 @@
           <a:p>
             <a:r>
               <a:rPr lang="en-GB" sz="1400" dirty="0" smtClean="0"/>
-              <a:t>=&gt; The </a:t>
-            </a:r>
-            <a:r>
-              <a:rPr lang="en-GB" sz="1400" dirty="0" smtClean="0"/>
-              <a:t>simplest solution is to only use </a:t>
+              <a:t>=&gt; The simplest solution is to only use </a:t>
             </a:r>
             <a:r>
               <a:rPr lang="en-GB" sz="1400" dirty="0" err="1" smtClean="0"/>
@@ -5162,11 +5244,7 @@
           <a:p>
             <a:r>
               <a:rPr lang="en-GB" sz="1200" dirty="0" smtClean="0"/>
-              <a:t>LIBRARIES</a:t>
-            </a:r>
-            <a:r>
-              <a:rPr lang="en-GB" sz="1200" dirty="0" smtClean="0"/>
-              <a:t>:</a:t>
+              <a:t>LIBRARIES:</a:t>
             </a:r>
           </a:p>
           <a:p>

</xml_diff>